<commit_message>
Changing the logic of channels: if there're same channels as the last one, sum the visit cnt of these ones.
</commit_message>
<xml_diff>
--- a/presentation.pptx
+++ b/presentation.pptx
@@ -1500,25 +1500,17 @@
             </a:r>
           </a:p>
           <a:p>
-            <a:pPr marL="0" indent="0">
+            <a:pPr marL="171450" indent="-171450">
               <a:buFontTx/>
-              <a:buNone/>
+              <a:buChar char="-"/>
             </a:pPr>
-            <a:r>
-              <a:rPr lang="pt-BR" dirty="0"/>
-              <a:t>- </a:t>
-            </a:r>
             <a:r>
               <a:rPr lang="pt-BR" b="1" dirty="0">
                 <a:highlight>
                   <a:srgbClr val="FFFF00"/>
                 </a:highlight>
               </a:rPr>
-              <a:t>Only visits that became a purchase (converted) -&gt; CONSIDERING ONLY THE LAST VISIT CNT</a:t>
-            </a:r>
-            <a:r>
-              <a:rPr lang="pt-BR" dirty="0"/>
-              <a:t>. </a:t>
+              <a:t>COLLECTED THE CHANNEL OF THE LAST VISIT FOR EACH USER + CAMPAIGN ID, THAN IF THERE’S OTHER VISITS IN THE SAME CHANNEL, I SUMMED ALL THE VISIT CNT. EXAMPLE: facebook (visit cnt = 10), email (visit cnt = 5), facebook (visit cnt = 20), than, it will be 10 + 20 = 30 for this user / campaign id.</a:t>
             </a:r>
           </a:p>
         </p:txBody>
@@ -18922,7 +18914,7 @@
         <p:spPr>
           <a:xfrm>
             <a:off x="378541" y="6095309"/>
-            <a:ext cx="8888729" cy="307777"/>
+            <a:ext cx="8888729" cy="523220"/>
           </a:xfrm>
           <a:prstGeom prst="rect">
             <a:avLst/>
@@ -18939,7 +18931,7 @@
               <a:rPr lang="pt-BR" sz="1400" dirty="0">
                 <a:latin typeface="Nunito Sans Normal" pitchFamily="2" charset="0"/>
               </a:rPr>
-              <a:t>* Considering time window of 1 year, same users and that the last visit was transformed into a convertion.</a:t>
+              <a:t>* Considering time window of 1 year, same users and that the sum of visit cnt that has the same channel for each user + campaign.</a:t>
             </a:r>
             <a:endParaRPr lang="pt-BR" sz="1400" dirty="0"/>
           </a:p>
@@ -18947,10 +18939,10 @@
       </p:sp>
       <p:pic>
         <p:nvPicPr>
-          <p:cNvPr id="10" name="Picture 9">
-            <a:extLst>
-              <a:ext uri="{FF2B5EF4-FFF2-40B4-BE49-F238E27FC236}">
-                <a16:creationId xmlns:a16="http://schemas.microsoft.com/office/drawing/2014/main" id="{028F8D65-F296-FEFC-8BC8-C6B4D4CA450C}"/>
+          <p:cNvPr id="4" name="Picture 3">
+            <a:extLst>
+              <a:ext uri="{FF2B5EF4-FFF2-40B4-BE49-F238E27FC236}">
+                <a16:creationId xmlns:a16="http://schemas.microsoft.com/office/drawing/2014/main" id="{10955B67-8819-8BC7-AB8E-12C59C42C32C}"/>
               </a:ext>
             </a:extLst>
           </p:cNvPr>
@@ -18961,13 +18953,14 @@
         </p:nvPicPr>
         <p:blipFill>
           <a:blip r:embed="rId6"/>
-          <a:srcRect l="579" t="1102" r="-579" b="-1102"/>
-          <a:stretch/>
+          <a:stretch>
+            <a:fillRect/>
+          </a:stretch>
         </p:blipFill>
         <p:spPr>
           <a:xfrm>
-            <a:off x="1846648" y="1204991"/>
-            <a:ext cx="8666342" cy="3641111"/>
+            <a:off x="1568532" y="1158507"/>
+            <a:ext cx="9206774" cy="3856623"/>
           </a:xfrm>
           <a:prstGeom prst="rect">
             <a:avLst/>

</xml_diff>

<commit_message>
Adding both scenarios in channels: considering all the same visits and only the final one
</commit_message>
<xml_diff>
--- a/presentation.pptx
+++ b/presentation.pptx
@@ -5,7 +5,7 @@
     <p:sldMasterId id="2147483648" r:id="rId1"/>
   </p:sldMasterIdLst>
   <p:notesMasterIdLst>
-    <p:notesMasterId r:id="rId37"/>
+    <p:notesMasterId r:id="rId40"/>
   </p:notesMasterIdLst>
   <p:sldIdLst>
     <p:sldId id="257" r:id="rId2"/>
@@ -24,25 +24,28 @@
     <p:sldId id="302" r:id="rId15"/>
     <p:sldId id="280" r:id="rId16"/>
     <p:sldId id="279" r:id="rId17"/>
-    <p:sldId id="281" r:id="rId18"/>
-    <p:sldId id="283" r:id="rId19"/>
-    <p:sldId id="282" r:id="rId20"/>
-    <p:sldId id="258" r:id="rId21"/>
-    <p:sldId id="259" r:id="rId22"/>
-    <p:sldId id="262" r:id="rId23"/>
-    <p:sldId id="288" r:id="rId24"/>
-    <p:sldId id="289" r:id="rId25"/>
-    <p:sldId id="284" r:id="rId26"/>
-    <p:sldId id="293" r:id="rId27"/>
-    <p:sldId id="285" r:id="rId28"/>
-    <p:sldId id="297" r:id="rId29"/>
-    <p:sldId id="299" r:id="rId30"/>
-    <p:sldId id="286" r:id="rId31"/>
-    <p:sldId id="294" r:id="rId32"/>
-    <p:sldId id="291" r:id="rId33"/>
-    <p:sldId id="295" r:id="rId34"/>
-    <p:sldId id="298" r:id="rId35"/>
-    <p:sldId id="300" r:id="rId36"/>
+    <p:sldId id="305" r:id="rId18"/>
+    <p:sldId id="281" r:id="rId19"/>
+    <p:sldId id="283" r:id="rId20"/>
+    <p:sldId id="282" r:id="rId21"/>
+    <p:sldId id="258" r:id="rId22"/>
+    <p:sldId id="259" r:id="rId23"/>
+    <p:sldId id="262" r:id="rId24"/>
+    <p:sldId id="288" r:id="rId25"/>
+    <p:sldId id="289" r:id="rId26"/>
+    <p:sldId id="284" r:id="rId27"/>
+    <p:sldId id="293" r:id="rId28"/>
+    <p:sldId id="285" r:id="rId29"/>
+    <p:sldId id="297" r:id="rId30"/>
+    <p:sldId id="299" r:id="rId31"/>
+    <p:sldId id="286" r:id="rId32"/>
+    <p:sldId id="294" r:id="rId33"/>
+    <p:sldId id="303" r:id="rId34"/>
+    <p:sldId id="304" r:id="rId35"/>
+    <p:sldId id="291" r:id="rId36"/>
+    <p:sldId id="295" r:id="rId37"/>
+    <p:sldId id="298" r:id="rId38"/>
+    <p:sldId id="300" r:id="rId39"/>
   </p:sldIdLst>
   <p:sldSz cx="12192000" cy="6858000"/>
   <p:notesSz cx="6858000" cy="9144000"/>
@@ -651,7 +654,7 @@
           <a:p>
             <a:fld id="{C4B12038-7FD9-43AA-A210-07538A4DEF4A}" type="slidenum">
               <a:rPr lang="pt-BR" smtClean="0"/>
-              <a:t>19</a:t>
+              <a:t>20</a:t>
             </a:fld>
             <a:endParaRPr lang="pt-BR"/>
           </a:p>
@@ -744,7 +747,7 @@
           <a:p>
             <a:fld id="{C4B12038-7FD9-43AA-A210-07538A4DEF4A}" type="slidenum">
               <a:rPr lang="pt-BR" smtClean="0"/>
-              <a:t>22</a:t>
+              <a:t>23</a:t>
             </a:fld>
             <a:endParaRPr lang="pt-BR"/>
           </a:p>
@@ -831,7 +834,7 @@
           <a:p>
             <a:fld id="{C4B12038-7FD9-43AA-A210-07538A4DEF4A}" type="slidenum">
               <a:rPr lang="pt-BR" smtClean="0"/>
-              <a:t>25</a:t>
+              <a:t>26</a:t>
             </a:fld>
             <a:endParaRPr lang="pt-BR"/>
           </a:p>
@@ -938,7 +941,7 @@
           <a:p>
             <a:fld id="{C4B12038-7FD9-43AA-A210-07538A4DEF4A}" type="slidenum">
               <a:rPr lang="pt-BR" smtClean="0"/>
-              <a:t>26</a:t>
+              <a:t>27</a:t>
             </a:fld>
             <a:endParaRPr lang="pt-BR"/>
           </a:p>
@@ -1022,7 +1025,7 @@
           <a:p>
             <a:fld id="{C4B12038-7FD9-43AA-A210-07538A4DEF4A}" type="slidenum">
               <a:rPr lang="pt-BR" smtClean="0"/>
-              <a:t>27</a:t>
+              <a:t>28</a:t>
             </a:fld>
             <a:endParaRPr lang="pt-BR"/>
           </a:p>
@@ -1169,7 +1172,7 @@
           <a:p>
             <a:fld id="{C4B12038-7FD9-43AA-A210-07538A4DEF4A}" type="slidenum">
               <a:rPr lang="pt-BR" smtClean="0"/>
-              <a:t>28</a:t>
+              <a:t>29</a:t>
             </a:fld>
             <a:endParaRPr lang="pt-BR"/>
           </a:p>
@@ -1340,7 +1343,7 @@
           <a:p>
             <a:fld id="{C4B12038-7FD9-43AA-A210-07538A4DEF4A}" type="slidenum">
               <a:rPr lang="pt-BR" smtClean="0"/>
-              <a:t>29</a:t>
+              <a:t>30</a:t>
             </a:fld>
             <a:endParaRPr lang="pt-BR"/>
           </a:p>
@@ -1424,7 +1427,7 @@
           <a:p>
             <a:fld id="{C4B12038-7FD9-43AA-A210-07538A4DEF4A}" type="slidenum">
               <a:rPr lang="pt-BR" smtClean="0"/>
-              <a:t>30</a:t>
+              <a:t>31</a:t>
             </a:fld>
             <a:endParaRPr lang="pt-BR"/>
           </a:p>
@@ -1510,7 +1513,7 @@
                   <a:srgbClr val="FFFF00"/>
                 </a:highlight>
               </a:rPr>
-              <a:t>COLLECTED THE CHANNEL OF THE LAST VISIT FOR EACH USER + CAMPAIGN ID, THAN IF THERE’S OTHER VISITS IN THE SAME CHANNEL, I SUMMED ALL THE VISIT CNT. EXAMPLE: facebook (visit cnt = 10), email (visit cnt = 5), facebook (visit cnt = 20), than, it will be 10 + 20 = 30 for this user / campaign id.</a:t>
+              <a:t>Only VISITS OF LAST CHANNEL (THE CONVERTED)</a:t>
             </a:r>
           </a:p>
         </p:txBody>
@@ -1532,7 +1535,7 @@
           <a:p>
             <a:fld id="{C4B12038-7FD9-43AA-A210-07538A4DEF4A}" type="slidenum">
               <a:rPr lang="pt-BR" smtClean="0"/>
-              <a:t>31</a:t>
+              <a:t>32</a:t>
             </a:fld>
             <a:endParaRPr lang="pt-BR"/>
           </a:p>
@@ -1556,7 +1559,13 @@
   <p:cSld>
     <p:spTree>
       <p:nvGrpSpPr>
-        <p:cNvPr id="1" name=""/>
+        <p:cNvPr id="1" name="">
+          <a:extLst>
+            <a:ext uri="{FF2B5EF4-FFF2-40B4-BE49-F238E27FC236}">
+              <a16:creationId xmlns:a16="http://schemas.microsoft.com/office/drawing/2014/main" id="{8E57A9B5-BC54-73E6-5EBA-B304DFBC5E64}"/>
+            </a:ext>
+          </a:extLst>
+        </p:cNvPr>
         <p:cNvGrpSpPr/>
         <p:nvPr/>
       </p:nvGrpSpPr>
@@ -1570,7 +1579,13 @@
       </p:grpSpPr>
       <p:sp>
         <p:nvSpPr>
-          <p:cNvPr id="2" name="Slide Image Placeholder 1"/>
+          <p:cNvPr id="2" name="Slide Image Placeholder 1">
+            <a:extLst>
+              <a:ext uri="{FF2B5EF4-FFF2-40B4-BE49-F238E27FC236}">
+                <a16:creationId xmlns:a16="http://schemas.microsoft.com/office/drawing/2014/main" id="{C73A8E78-CB6E-34F7-0819-AE3168B0C42C}"/>
+              </a:ext>
+            </a:extLst>
+          </p:cNvPr>
           <p:cNvSpPr>
             <a:spLocks noGrp="1" noRot="1" noChangeAspect="1"/>
           </p:cNvSpPr>
@@ -1582,7 +1597,13 @@
       </p:sp>
       <p:sp>
         <p:nvSpPr>
-          <p:cNvPr id="3" name="Notes Placeholder 2"/>
+          <p:cNvPr id="3" name="Notes Placeholder 2">
+            <a:extLst>
+              <a:ext uri="{FF2B5EF4-FFF2-40B4-BE49-F238E27FC236}">
+                <a16:creationId xmlns:a16="http://schemas.microsoft.com/office/drawing/2014/main" id="{843F04C9-FD6F-D10B-5D89-F0ABC0298DF7}"/>
+              </a:ext>
+            </a:extLst>
+          </p:cNvPr>
           <p:cNvSpPr>
             <a:spLocks noGrp="1"/>
           </p:cNvSpPr>
@@ -1596,23 +1617,42 @@
           <a:lstStyle/>
           <a:p>
             <a:r>
+              <a:rPr lang="pt-BR" dirty="0"/>
+              <a:t>Considering:</a:t>
+            </a:r>
+            <a:br>
+              <a:rPr lang="pt-BR" dirty="0"/>
+            </a:br>
+            <a:r>
+              <a:rPr lang="pt-BR" dirty="0"/>
+              <a:t>- only the 451 users from before-</a:t>
+            </a:r>
+          </a:p>
+          <a:p>
+            <a:pPr marL="171450" indent="-171450">
+              <a:buFontTx/>
+              <a:buChar char="-"/>
+            </a:pPr>
+            <a:r>
               <a:rPr lang="pt-BR" b="1" dirty="0">
                 <a:highlight>
                   <a:srgbClr val="FFFF00"/>
                 </a:highlight>
               </a:rPr>
-              <a:t>Only visits that became a purchase (converted) -&gt; CONSIDERING ONLY THE LAST VISIT CNT</a:t>
-            </a:r>
-            <a:r>
-              <a:rPr lang="pt-BR" dirty="0"/>
-              <a:t>. </a:t>
+              <a:t>COLLECTED THE CHANNEL OF THE LAST VISIT FOR EACH USER + CAMPAIGN ID, THAN IF THERE’S OTHER VISITS IN THE SAME CHANNEL, I SUMMED ALL THE VISIT CNT. EXAMPLE: facebook (visit cnt = 10), email (visit cnt = 5), facebook (visit cnt = 20), than, it will be 10 + 20 = 30 for this user / campaign id.</a:t>
             </a:r>
           </a:p>
         </p:txBody>
       </p:sp>
       <p:sp>
         <p:nvSpPr>
-          <p:cNvPr id="4" name="Slide Number Placeholder 3"/>
+          <p:cNvPr id="4" name="Slide Number Placeholder 3">
+            <a:extLst>
+              <a:ext uri="{FF2B5EF4-FFF2-40B4-BE49-F238E27FC236}">
+                <a16:creationId xmlns:a16="http://schemas.microsoft.com/office/drawing/2014/main" id="{F5666083-28C0-B6BC-EBBB-D82D891707A3}"/>
+              </a:ext>
+            </a:extLst>
+          </p:cNvPr>
           <p:cNvSpPr>
             <a:spLocks noGrp="1"/>
           </p:cNvSpPr>
@@ -1627,7 +1667,7 @@
           <a:p>
             <a:fld id="{C4B12038-7FD9-43AA-A210-07538A4DEF4A}" type="slidenum">
               <a:rPr lang="pt-BR" smtClean="0"/>
-              <a:t>32</a:t>
+              <a:t>33</a:t>
             </a:fld>
             <a:endParaRPr lang="pt-BR"/>
           </a:p>
@@ -1636,7 +1676,7 @@
     </p:spTree>
     <p:extLst>
       <p:ext uri="{BB962C8B-B14F-4D97-AF65-F5344CB8AC3E}">
-        <p14:creationId xmlns:p14="http://schemas.microsoft.com/office/powerpoint/2010/main" val="3495108089"/>
+        <p14:creationId xmlns:p14="http://schemas.microsoft.com/office/powerpoint/2010/main" val="961173272"/>
       </p:ext>
     </p:extLst>
   </p:cSld>
@@ -1762,7 +1802,7 @@
         <p:cNvPr id="1" name="">
           <a:extLst>
             <a:ext uri="{FF2B5EF4-FFF2-40B4-BE49-F238E27FC236}">
-              <a16:creationId xmlns:a16="http://schemas.microsoft.com/office/drawing/2014/main" id="{AC02FCF2-D2C6-2C5F-2C76-7207DDC75BFC}"/>
+              <a16:creationId xmlns:a16="http://schemas.microsoft.com/office/drawing/2014/main" id="{43818B85-C2A3-ED98-40F3-6331E3AEE6C2}"/>
             </a:ext>
           </a:extLst>
         </p:cNvPr>
@@ -1782,7 +1822,7 @@
           <p:cNvPr id="2" name="Slide Image Placeholder 1">
             <a:extLst>
               <a:ext uri="{FF2B5EF4-FFF2-40B4-BE49-F238E27FC236}">
-                <a16:creationId xmlns:a16="http://schemas.microsoft.com/office/drawing/2014/main" id="{1E7702ED-3BB9-CAB1-2F8C-A123B7F175C6}"/>
+                <a16:creationId xmlns:a16="http://schemas.microsoft.com/office/drawing/2014/main" id="{574B1F0D-322E-0188-D1FE-C3D43CB6F649}"/>
               </a:ext>
             </a:extLst>
           </p:cNvPr>
@@ -1800,7 +1840,7 @@
           <p:cNvPr id="3" name="Notes Placeholder 2">
             <a:extLst>
               <a:ext uri="{FF2B5EF4-FFF2-40B4-BE49-F238E27FC236}">
-                <a16:creationId xmlns:a16="http://schemas.microsoft.com/office/drawing/2014/main" id="{DC7BB79C-B5F7-69FB-1E42-7F5FA364CE6F}"/>
+                <a16:creationId xmlns:a16="http://schemas.microsoft.com/office/drawing/2014/main" id="{AD627AC1-40CE-45DC-1B54-3265507C943F}"/>
               </a:ext>
             </a:extLst>
           </p:cNvPr>
@@ -1816,7 +1856,31 @@
           <a:bodyPr/>
           <a:lstStyle/>
           <a:p>
-            <a:endParaRPr lang="pt-BR" dirty="0"/>
+            <a:r>
+              <a:rPr lang="pt-BR" dirty="0"/>
+              <a:t>Considering:</a:t>
+            </a:r>
+            <a:br>
+              <a:rPr lang="pt-BR" dirty="0"/>
+            </a:br>
+            <a:r>
+              <a:rPr lang="pt-BR" dirty="0"/>
+              <a:t>- only the 451 users from before-</a:t>
+            </a:r>
+          </a:p>
+          <a:p>
+            <a:pPr marL="171450" indent="-171450">
+              <a:buFontTx/>
+              <a:buChar char="-"/>
+            </a:pPr>
+            <a:r>
+              <a:rPr lang="pt-BR" b="1" dirty="0">
+                <a:highlight>
+                  <a:srgbClr val="FFFF00"/>
+                </a:highlight>
+              </a:rPr>
+              <a:t>COLLECTED THE CHANNEL OF THE LAST VISIT FOR EACH USER + CAMPAIGN ID, THAN IF THERE’S OTHER VISITS IN THE SAME CHANNEL, I SUMMED ALL THE VISIT CNT. EXAMPLE: facebook (visit cnt = 10), email (visit cnt = 5), facebook (visit cnt = 20), than, it will be 10 + 20 = 30 for this user / campaign id.</a:t>
+            </a:r>
           </a:p>
         </p:txBody>
       </p:sp>
@@ -1825,7 +1889,7 @@
           <p:cNvPr id="4" name="Slide Number Placeholder 3">
             <a:extLst>
               <a:ext uri="{FF2B5EF4-FFF2-40B4-BE49-F238E27FC236}">
-                <a16:creationId xmlns:a16="http://schemas.microsoft.com/office/drawing/2014/main" id="{FA932FE7-F4C5-0F35-776B-EF389F8A34F9}"/>
+                <a16:creationId xmlns:a16="http://schemas.microsoft.com/office/drawing/2014/main" id="{A3E501D8-F3C3-B033-AE5E-79B3EA7A284C}"/>
               </a:ext>
             </a:extLst>
           </p:cNvPr>
@@ -1843,7 +1907,7 @@
           <a:p>
             <a:fld id="{C4B12038-7FD9-43AA-A210-07538A4DEF4A}" type="slidenum">
               <a:rPr lang="pt-BR" smtClean="0"/>
-              <a:t>33</a:t>
+              <a:t>34</a:t>
             </a:fld>
             <a:endParaRPr lang="pt-BR"/>
           </a:p>
@@ -1852,7 +1916,7 @@
     </p:spTree>
     <p:extLst>
       <p:ext uri="{BB962C8B-B14F-4D97-AF65-F5344CB8AC3E}">
-        <p14:creationId xmlns:p14="http://schemas.microsoft.com/office/powerpoint/2010/main" val="2592947192"/>
+        <p14:creationId xmlns:p14="http://schemas.microsoft.com/office/powerpoint/2010/main" val="291566219"/>
       </p:ext>
     </p:extLst>
   </p:cSld>
@@ -1906,7 +1970,18 @@
           <a:bodyPr/>
           <a:lstStyle/>
           <a:p>
-            <a:endParaRPr lang="pt-BR" dirty="0"/>
+            <a:r>
+              <a:rPr lang="pt-BR" b="1" dirty="0">
+                <a:highlight>
+                  <a:srgbClr val="FFFF00"/>
+                </a:highlight>
+              </a:rPr>
+              <a:t>Only visits that became a purchase (converted) -&gt; CONSIDERING ONLY THE LAST VISIT CNT</a:t>
+            </a:r>
+            <a:r>
+              <a:rPr lang="pt-BR" dirty="0"/>
+              <a:t>. </a:t>
+            </a:r>
           </a:p>
         </p:txBody>
       </p:sp>
@@ -1927,7 +2002,199 @@
           <a:p>
             <a:fld id="{C4B12038-7FD9-43AA-A210-07538A4DEF4A}" type="slidenum">
               <a:rPr lang="pt-BR" smtClean="0"/>
-              <a:t>34</a:t>
+              <a:t>35</a:t>
+            </a:fld>
+            <a:endParaRPr lang="pt-BR"/>
+          </a:p>
+        </p:txBody>
+      </p:sp>
+    </p:spTree>
+    <p:extLst>
+      <p:ext uri="{BB962C8B-B14F-4D97-AF65-F5344CB8AC3E}">
+        <p14:creationId xmlns:p14="http://schemas.microsoft.com/office/powerpoint/2010/main" val="3495108089"/>
+      </p:ext>
+    </p:extLst>
+  </p:cSld>
+  <p:clrMapOvr>
+    <a:masterClrMapping/>
+  </p:clrMapOvr>
+</p:notes>
+</file>
+
+<file path=ppt/notesSlides/notesSlide22.xml><?xml version="1.0" encoding="utf-8"?>
+<p:notes xmlns:a="http://schemas.openxmlformats.org/drawingml/2006/main" xmlns:r="http://schemas.openxmlformats.org/officeDocument/2006/relationships" xmlns:p="http://schemas.openxmlformats.org/presentationml/2006/main">
+  <p:cSld>
+    <p:spTree>
+      <p:nvGrpSpPr>
+        <p:cNvPr id="1" name="">
+          <a:extLst>
+            <a:ext uri="{FF2B5EF4-FFF2-40B4-BE49-F238E27FC236}">
+              <a16:creationId xmlns:a16="http://schemas.microsoft.com/office/drawing/2014/main" id="{AC02FCF2-D2C6-2C5F-2C76-7207DDC75BFC}"/>
+            </a:ext>
+          </a:extLst>
+        </p:cNvPr>
+        <p:cNvGrpSpPr/>
+        <p:nvPr/>
+      </p:nvGrpSpPr>
+      <p:grpSpPr>
+        <a:xfrm>
+          <a:off x="0" y="0"/>
+          <a:ext cx="0" cy="0"/>
+          <a:chOff x="0" y="0"/>
+          <a:chExt cx="0" cy="0"/>
+        </a:xfrm>
+      </p:grpSpPr>
+      <p:sp>
+        <p:nvSpPr>
+          <p:cNvPr id="2" name="Slide Image Placeholder 1">
+            <a:extLst>
+              <a:ext uri="{FF2B5EF4-FFF2-40B4-BE49-F238E27FC236}">
+                <a16:creationId xmlns:a16="http://schemas.microsoft.com/office/drawing/2014/main" id="{1E7702ED-3BB9-CAB1-2F8C-A123B7F175C6}"/>
+              </a:ext>
+            </a:extLst>
+          </p:cNvPr>
+          <p:cNvSpPr>
+            <a:spLocks noGrp="1" noRot="1" noChangeAspect="1"/>
+          </p:cNvSpPr>
+          <p:nvPr>
+            <p:ph type="sldImg"/>
+          </p:nvPr>
+        </p:nvSpPr>
+        <p:spPr/>
+      </p:sp>
+      <p:sp>
+        <p:nvSpPr>
+          <p:cNvPr id="3" name="Notes Placeholder 2">
+            <a:extLst>
+              <a:ext uri="{FF2B5EF4-FFF2-40B4-BE49-F238E27FC236}">
+                <a16:creationId xmlns:a16="http://schemas.microsoft.com/office/drawing/2014/main" id="{DC7BB79C-B5F7-69FB-1E42-7F5FA364CE6F}"/>
+              </a:ext>
+            </a:extLst>
+          </p:cNvPr>
+          <p:cNvSpPr>
+            <a:spLocks noGrp="1"/>
+          </p:cNvSpPr>
+          <p:nvPr>
+            <p:ph type="body" idx="1"/>
+          </p:nvPr>
+        </p:nvSpPr>
+        <p:spPr/>
+        <p:txBody>
+          <a:bodyPr/>
+          <a:lstStyle/>
+          <a:p>
+            <a:endParaRPr lang="pt-BR" dirty="0"/>
+          </a:p>
+        </p:txBody>
+      </p:sp>
+      <p:sp>
+        <p:nvSpPr>
+          <p:cNvPr id="4" name="Slide Number Placeholder 3">
+            <a:extLst>
+              <a:ext uri="{FF2B5EF4-FFF2-40B4-BE49-F238E27FC236}">
+                <a16:creationId xmlns:a16="http://schemas.microsoft.com/office/drawing/2014/main" id="{FA932FE7-F4C5-0F35-776B-EF389F8A34F9}"/>
+              </a:ext>
+            </a:extLst>
+          </p:cNvPr>
+          <p:cNvSpPr>
+            <a:spLocks noGrp="1"/>
+          </p:cNvSpPr>
+          <p:nvPr>
+            <p:ph type="sldNum" sz="quarter" idx="5"/>
+          </p:nvPr>
+        </p:nvSpPr>
+        <p:spPr/>
+        <p:txBody>
+          <a:bodyPr/>
+          <a:lstStyle/>
+          <a:p>
+            <a:fld id="{C4B12038-7FD9-43AA-A210-07538A4DEF4A}" type="slidenum">
+              <a:rPr lang="pt-BR" smtClean="0"/>
+              <a:t>36</a:t>
+            </a:fld>
+            <a:endParaRPr lang="pt-BR"/>
+          </a:p>
+        </p:txBody>
+      </p:sp>
+    </p:spTree>
+    <p:extLst>
+      <p:ext uri="{BB962C8B-B14F-4D97-AF65-F5344CB8AC3E}">
+        <p14:creationId xmlns:p14="http://schemas.microsoft.com/office/powerpoint/2010/main" val="2592947192"/>
+      </p:ext>
+    </p:extLst>
+  </p:cSld>
+  <p:clrMapOvr>
+    <a:masterClrMapping/>
+  </p:clrMapOvr>
+</p:notes>
+</file>
+
+<file path=ppt/notesSlides/notesSlide23.xml><?xml version="1.0" encoding="utf-8"?>
+<p:notes xmlns:a="http://schemas.openxmlformats.org/drawingml/2006/main" xmlns:r="http://schemas.openxmlformats.org/officeDocument/2006/relationships" xmlns:p="http://schemas.openxmlformats.org/presentationml/2006/main">
+  <p:cSld>
+    <p:spTree>
+      <p:nvGrpSpPr>
+        <p:cNvPr id="1" name=""/>
+        <p:cNvGrpSpPr/>
+        <p:nvPr/>
+      </p:nvGrpSpPr>
+      <p:grpSpPr>
+        <a:xfrm>
+          <a:off x="0" y="0"/>
+          <a:ext cx="0" cy="0"/>
+          <a:chOff x="0" y="0"/>
+          <a:chExt cx="0" cy="0"/>
+        </a:xfrm>
+      </p:grpSpPr>
+      <p:sp>
+        <p:nvSpPr>
+          <p:cNvPr id="2" name="Slide Image Placeholder 1"/>
+          <p:cNvSpPr>
+            <a:spLocks noGrp="1" noRot="1" noChangeAspect="1"/>
+          </p:cNvSpPr>
+          <p:nvPr>
+            <p:ph type="sldImg"/>
+          </p:nvPr>
+        </p:nvSpPr>
+        <p:spPr/>
+      </p:sp>
+      <p:sp>
+        <p:nvSpPr>
+          <p:cNvPr id="3" name="Notes Placeholder 2"/>
+          <p:cNvSpPr>
+            <a:spLocks noGrp="1"/>
+          </p:cNvSpPr>
+          <p:nvPr>
+            <p:ph type="body" idx="1"/>
+          </p:nvPr>
+        </p:nvSpPr>
+        <p:spPr/>
+        <p:txBody>
+          <a:bodyPr/>
+          <a:lstStyle/>
+          <a:p>
+            <a:endParaRPr lang="pt-BR" dirty="0"/>
+          </a:p>
+        </p:txBody>
+      </p:sp>
+      <p:sp>
+        <p:nvSpPr>
+          <p:cNvPr id="4" name="Slide Number Placeholder 3"/>
+          <p:cNvSpPr>
+            <a:spLocks noGrp="1"/>
+          </p:cNvSpPr>
+          <p:nvPr>
+            <p:ph type="sldNum" sz="quarter" idx="5"/>
+          </p:nvPr>
+        </p:nvSpPr>
+        <p:spPr/>
+        <p:txBody>
+          <a:bodyPr/>
+          <a:lstStyle/>
+          <a:p>
+            <a:fld id="{C4B12038-7FD9-43AA-A210-07538A4DEF4A}" type="slidenum">
+              <a:rPr lang="pt-BR" smtClean="0"/>
+              <a:t>37</a:t>
             </a:fld>
             <a:endParaRPr lang="pt-BR"/>
           </a:p>
@@ -2737,7 +3004,7 @@
           <a:p>
             <a:fld id="{C4B12038-7FD9-43AA-A210-07538A4DEF4A}" type="slidenum">
               <a:rPr lang="pt-BR" smtClean="0"/>
-              <a:t>17</a:t>
+              <a:t>18</a:t>
             </a:fld>
             <a:endParaRPr lang="pt-BR"/>
           </a:p>
@@ -2848,7 +3115,7 @@
           <a:p>
             <a:fld id="{C4B12038-7FD9-43AA-A210-07538A4DEF4A}" type="slidenum">
               <a:rPr lang="pt-BR" smtClean="0"/>
-              <a:t>18</a:t>
+              <a:t>19</a:t>
             </a:fld>
             <a:endParaRPr lang="pt-BR"/>
           </a:p>
@@ -8383,7 +8650,7 @@
         <p:cNvPr id="1" name="">
           <a:extLst>
             <a:ext uri="{FF2B5EF4-FFF2-40B4-BE49-F238E27FC236}">
-              <a16:creationId xmlns:a16="http://schemas.microsoft.com/office/drawing/2014/main" id="{11A312F6-B7A9-D6F5-CF13-27DBC8B1BD4D}"/>
+              <a16:creationId xmlns:a16="http://schemas.microsoft.com/office/drawing/2014/main" id="{CEF2ED49-4FEF-8BF5-1F07-3DE85F0EEF58}"/>
             </a:ext>
           </a:extLst>
         </p:cNvPr>
@@ -8400,10 +8667,10 @@
       </p:grpSpPr>
       <p:sp>
         <p:nvSpPr>
-          <p:cNvPr id="6" name="Rectangle 5">
-            <a:extLst>
-              <a:ext uri="{FF2B5EF4-FFF2-40B4-BE49-F238E27FC236}">
-                <a16:creationId xmlns:a16="http://schemas.microsoft.com/office/drawing/2014/main" id="{73D0E073-DEC6-BCA1-D277-C07317DEDB12}"/>
+          <p:cNvPr id="5" name="Rectangle 4">
+            <a:extLst>
+              <a:ext uri="{FF2B5EF4-FFF2-40B4-BE49-F238E27FC236}">
+                <a16:creationId xmlns:a16="http://schemas.microsoft.com/office/drawing/2014/main" id="{B2BEDB0F-7300-A6CB-AB84-3FAD4D12C714}"/>
               </a:ext>
             </a:extLst>
           </p:cNvPr>
@@ -8412,8 +8679,8 @@
         </p:nvSpPr>
         <p:spPr>
           <a:xfrm>
-            <a:off x="0" y="0"/>
-            <a:ext cx="12191999" cy="6858000"/>
+            <a:off x="8634581" y="0"/>
+            <a:ext cx="3557418" cy="6858000"/>
           </a:xfrm>
           <a:prstGeom prst="rect">
             <a:avLst/>
@@ -8452,10 +8719,10 @@
       </p:sp>
       <p:pic>
         <p:nvPicPr>
-          <p:cNvPr id="1026" name="Picture 2" descr="FabFitFun - Beauty, Fitness, Lifestyle">
-            <a:extLst>
-              <a:ext uri="{FF2B5EF4-FFF2-40B4-BE49-F238E27FC236}">
-                <a16:creationId xmlns:a16="http://schemas.microsoft.com/office/drawing/2014/main" id="{E35CB271-08E8-9D4B-B9DE-F39B0DC5FBCD}"/>
+          <p:cNvPr id="19" name="Picture 2" descr="FabFitFun - Beauty, Fitness, Lifestyle">
+            <a:extLst>
+              <a:ext uri="{FF2B5EF4-FFF2-40B4-BE49-F238E27FC236}">
+                <a16:creationId xmlns:a16="http://schemas.microsoft.com/office/drawing/2014/main" id="{DEB9A443-D936-D039-490B-4DD290B701AD}"/>
               </a:ext>
             </a:extLst>
           </p:cNvPr>
@@ -8465,7 +8732,7 @@
           <p:nvPr/>
         </p:nvPicPr>
         <p:blipFill>
-          <a:blip r:embed="rId3">
+          <a:blip r:embed="rId2">
             <a:extLst>
               <a:ext uri="{28A0092B-C50C-407E-A947-70E740481C1C}">
                 <a14:useLocalDpi xmlns:a14="http://schemas.microsoft.com/office/drawing/2010/main" val="0"/>
@@ -8499,6 +8766,291 @@
       </p:pic>
       <p:sp>
         <p:nvSpPr>
+          <p:cNvPr id="7" name="TextBox 6">
+            <a:extLst>
+              <a:ext uri="{FF2B5EF4-FFF2-40B4-BE49-F238E27FC236}">
+                <a16:creationId xmlns:a16="http://schemas.microsoft.com/office/drawing/2014/main" id="{ABF45229-9584-3388-F750-6F6B8187D0B4}"/>
+              </a:ext>
+            </a:extLst>
+          </p:cNvPr>
+          <p:cNvSpPr txBox="1"/>
+          <p:nvPr/>
+        </p:nvSpPr>
+        <p:spPr>
+          <a:xfrm>
+            <a:off x="8777320" y="2159699"/>
+            <a:ext cx="3407596" cy="646331"/>
+          </a:xfrm>
+          <a:prstGeom prst="rect">
+            <a:avLst/>
+          </a:prstGeom>
+          <a:noFill/>
+        </p:spPr>
+        <p:txBody>
+          <a:bodyPr wrap="square">
+            <a:spAutoFit/>
+          </a:bodyPr>
+          <a:lstStyle/>
+          <a:p>
+            <a:r>
+              <a:rPr lang="pt-BR" dirty="0">
+                <a:latin typeface="Nunito Sans Normal" pitchFamily="2" charset="0"/>
+              </a:rPr>
+              <a:t>Over 10000 rows with non attributed channel.</a:t>
+            </a:r>
+          </a:p>
+        </p:txBody>
+      </p:sp>
+      <p:sp>
+        <p:nvSpPr>
+          <p:cNvPr id="8" name="TextBox 7">
+            <a:extLst>
+              <a:ext uri="{FF2B5EF4-FFF2-40B4-BE49-F238E27FC236}">
+                <a16:creationId xmlns:a16="http://schemas.microsoft.com/office/drawing/2014/main" id="{B8EF822D-9B2C-3FE9-5182-7D1E746DD98D}"/>
+              </a:ext>
+            </a:extLst>
+          </p:cNvPr>
+          <p:cNvSpPr txBox="1"/>
+          <p:nvPr/>
+        </p:nvSpPr>
+        <p:spPr>
+          <a:xfrm>
+            <a:off x="8951190" y="1282082"/>
+            <a:ext cx="2924200" cy="523220"/>
+          </a:xfrm>
+          <a:prstGeom prst="rect">
+            <a:avLst/>
+          </a:prstGeom>
+          <a:noFill/>
+        </p:spPr>
+        <p:txBody>
+          <a:bodyPr wrap="square">
+            <a:spAutoFit/>
+          </a:bodyPr>
+          <a:lstStyle/>
+          <a:p>
+            <a:pPr algn="ctr"/>
+            <a:r>
+              <a:rPr lang="pt-BR" sz="2800" b="1" dirty="0">
+                <a:latin typeface="Nunito Sans Normal" pitchFamily="2" charset="0"/>
+              </a:rPr>
+              <a:t>INSIGHTS</a:t>
+            </a:r>
+          </a:p>
+        </p:txBody>
+      </p:sp>
+      <p:sp>
+        <p:nvSpPr>
+          <p:cNvPr id="11" name="TextBox 10">
+            <a:extLst>
+              <a:ext uri="{FF2B5EF4-FFF2-40B4-BE49-F238E27FC236}">
+                <a16:creationId xmlns:a16="http://schemas.microsoft.com/office/drawing/2014/main" id="{B9DB7EA7-EFB6-3977-CC64-197671D5BB41}"/>
+              </a:ext>
+            </a:extLst>
+          </p:cNvPr>
+          <p:cNvSpPr txBox="1"/>
+          <p:nvPr/>
+        </p:nvSpPr>
+        <p:spPr>
+          <a:xfrm>
+            <a:off x="137652" y="48592"/>
+            <a:ext cx="7414209" cy="861774"/>
+          </a:xfrm>
+          <a:prstGeom prst="rect">
+            <a:avLst/>
+          </a:prstGeom>
+          <a:noFill/>
+        </p:spPr>
+        <p:txBody>
+          <a:bodyPr wrap="none" rtlCol="0">
+            <a:spAutoFit/>
+          </a:bodyPr>
+          <a:lstStyle/>
+          <a:p>
+            <a:r>
+              <a:rPr lang="pt-BR" sz="3200" b="1" dirty="0">
+                <a:latin typeface="Nunito Sans Normal" pitchFamily="2" charset="0"/>
+              </a:rPr>
+              <a:t>3. DATA GAP AND INCONSISTENCES</a:t>
+            </a:r>
+          </a:p>
+          <a:p>
+            <a:r>
+              <a:rPr lang="pt-BR" dirty="0">
+                <a:latin typeface="Nunito Sans Normal" pitchFamily="2" charset="0"/>
+              </a:rPr>
+              <a:t>3.8 NON-ATTRIBUTED IN CHANNELS</a:t>
+            </a:r>
+          </a:p>
+        </p:txBody>
+      </p:sp>
+      <p:pic>
+        <p:nvPicPr>
+          <p:cNvPr id="4" name="Picture 3">
+            <a:extLst>
+              <a:ext uri="{FF2B5EF4-FFF2-40B4-BE49-F238E27FC236}">
+                <a16:creationId xmlns:a16="http://schemas.microsoft.com/office/drawing/2014/main" id="{B5B91916-A9F9-5C22-5DB3-92E536E4677E}"/>
+              </a:ext>
+            </a:extLst>
+          </p:cNvPr>
+          <p:cNvPicPr>
+            <a:picLocks noChangeAspect="1"/>
+          </p:cNvPicPr>
+          <p:nvPr/>
+        </p:nvPicPr>
+        <p:blipFill>
+          <a:blip r:embed="rId3"/>
+          <a:stretch>
+            <a:fillRect/>
+          </a:stretch>
+        </p:blipFill>
+        <p:spPr>
+          <a:xfrm>
+            <a:off x="7084" y="1543692"/>
+            <a:ext cx="8526133" cy="4127645"/>
+          </a:xfrm>
+          <a:prstGeom prst="rect">
+            <a:avLst/>
+          </a:prstGeom>
+        </p:spPr>
+      </p:pic>
+    </p:spTree>
+    <p:extLst>
+      <p:ext uri="{BB962C8B-B14F-4D97-AF65-F5344CB8AC3E}">
+        <p14:creationId xmlns:p14="http://schemas.microsoft.com/office/powerpoint/2010/main" val="3380073122"/>
+      </p:ext>
+    </p:extLst>
+  </p:cSld>
+  <p:clrMapOvr>
+    <a:masterClrMapping/>
+  </p:clrMapOvr>
+</p:sld>
+</file>
+
+<file path=ppt/slides/slide18.xml><?xml version="1.0" encoding="utf-8"?>
+<p:sld xmlns:a="http://schemas.openxmlformats.org/drawingml/2006/main" xmlns:r="http://schemas.openxmlformats.org/officeDocument/2006/relationships" xmlns:p="http://schemas.openxmlformats.org/presentationml/2006/main">
+  <p:cSld>
+    <p:spTree>
+      <p:nvGrpSpPr>
+        <p:cNvPr id="1" name="">
+          <a:extLst>
+            <a:ext uri="{FF2B5EF4-FFF2-40B4-BE49-F238E27FC236}">
+              <a16:creationId xmlns:a16="http://schemas.microsoft.com/office/drawing/2014/main" id="{11A312F6-B7A9-D6F5-CF13-27DBC8B1BD4D}"/>
+            </a:ext>
+          </a:extLst>
+        </p:cNvPr>
+        <p:cNvGrpSpPr/>
+        <p:nvPr/>
+      </p:nvGrpSpPr>
+      <p:grpSpPr>
+        <a:xfrm>
+          <a:off x="0" y="0"/>
+          <a:ext cx="0" cy="0"/>
+          <a:chOff x="0" y="0"/>
+          <a:chExt cx="0" cy="0"/>
+        </a:xfrm>
+      </p:grpSpPr>
+      <p:sp>
+        <p:nvSpPr>
+          <p:cNvPr id="6" name="Rectangle 5">
+            <a:extLst>
+              <a:ext uri="{FF2B5EF4-FFF2-40B4-BE49-F238E27FC236}">
+                <a16:creationId xmlns:a16="http://schemas.microsoft.com/office/drawing/2014/main" id="{73D0E073-DEC6-BCA1-D277-C07317DEDB12}"/>
+              </a:ext>
+            </a:extLst>
+          </p:cNvPr>
+          <p:cNvSpPr/>
+          <p:nvPr/>
+        </p:nvSpPr>
+        <p:spPr>
+          <a:xfrm>
+            <a:off x="0" y="0"/>
+            <a:ext cx="12191999" cy="6858000"/>
+          </a:xfrm>
+          <a:prstGeom prst="rect">
+            <a:avLst/>
+          </a:prstGeom>
+          <a:solidFill>
+            <a:srgbClr val="FEBAA8"/>
+          </a:solidFill>
+          <a:ln>
+            <a:noFill/>
+          </a:ln>
+        </p:spPr>
+        <p:style>
+          <a:lnRef idx="2">
+            <a:schemeClr val="accent1">
+              <a:shade val="15000"/>
+            </a:schemeClr>
+          </a:lnRef>
+          <a:fillRef idx="1">
+            <a:schemeClr val="accent1"/>
+          </a:fillRef>
+          <a:effectRef idx="0">
+            <a:schemeClr val="accent1"/>
+          </a:effectRef>
+          <a:fontRef idx="minor">
+            <a:schemeClr val="lt1"/>
+          </a:fontRef>
+        </p:style>
+        <p:txBody>
+          <a:bodyPr rtlCol="0" anchor="ctr"/>
+          <a:lstStyle/>
+          <a:p>
+            <a:pPr algn="ctr"/>
+            <a:endParaRPr lang="pt-BR"/>
+          </a:p>
+        </p:txBody>
+      </p:sp>
+      <p:pic>
+        <p:nvPicPr>
+          <p:cNvPr id="1026" name="Picture 2" descr="FabFitFun - Beauty, Fitness, Lifestyle">
+            <a:extLst>
+              <a:ext uri="{FF2B5EF4-FFF2-40B4-BE49-F238E27FC236}">
+                <a16:creationId xmlns:a16="http://schemas.microsoft.com/office/drawing/2014/main" id="{E35CB271-08E8-9D4B-B9DE-F39B0DC5FBCD}"/>
+              </a:ext>
+            </a:extLst>
+          </p:cNvPr>
+          <p:cNvPicPr>
+            <a:picLocks noChangeAspect="1" noChangeArrowheads="1"/>
+          </p:cNvPicPr>
+          <p:nvPr/>
+        </p:nvPicPr>
+        <p:blipFill>
+          <a:blip r:embed="rId3">
+            <a:extLst>
+              <a:ext uri="{28A0092B-C50C-407E-A947-70E740481C1C}">
+                <a14:useLocalDpi xmlns:a14="http://schemas.microsoft.com/office/drawing/2010/main" val="0"/>
+              </a:ext>
+            </a:extLst>
+          </a:blip>
+          <a:srcRect/>
+          <a:stretch>
+            <a:fillRect/>
+          </a:stretch>
+        </p:blipFill>
+        <p:spPr bwMode="auto">
+          <a:xfrm>
+            <a:off x="10053486" y="5886204"/>
+            <a:ext cx="1759973" cy="725989"/>
+          </a:xfrm>
+          <a:prstGeom prst="rect">
+            <a:avLst/>
+          </a:prstGeom>
+          <a:noFill/>
+          <a:extLst>
+            <a:ext uri="{909E8E84-426E-40DD-AFC4-6F175D3DCCD1}">
+              <a14:hiddenFill xmlns:a14="http://schemas.microsoft.com/office/drawing/2010/main">
+                <a:solidFill>
+                  <a:srgbClr val="FFFFFF"/>
+                </a:solidFill>
+              </a14:hiddenFill>
+            </a:ext>
+          </a:extLst>
+        </p:spPr>
+      </p:pic>
+      <p:sp>
+        <p:nvSpPr>
           <p:cNvPr id="5" name="TextBox 4">
             <a:extLst>
               <a:ext uri="{FF2B5EF4-FFF2-40B4-BE49-F238E27FC236}">
@@ -8547,7 +9099,7 @@
 </p:sld>
 </file>
 
-<file path=ppt/slides/slide18.xml><?xml version="1.0" encoding="utf-8"?>
+<file path=ppt/slides/slide19.xml><?xml version="1.0" encoding="utf-8"?>
 <p:sld xmlns:a="http://schemas.openxmlformats.org/drawingml/2006/main" xmlns:r="http://schemas.openxmlformats.org/officeDocument/2006/relationships" xmlns:p="http://schemas.openxmlformats.org/presentationml/2006/main">
   <p:cSld>
     <p:spTree>
@@ -8572,6 +9124,58 @@
       </p:grpSpPr>
       <p:sp>
         <p:nvSpPr>
+          <p:cNvPr id="3" name="Rectangle: Rounded Corners 2">
+            <a:extLst>
+              <a:ext uri="{FF2B5EF4-FFF2-40B4-BE49-F238E27FC236}">
+                <a16:creationId xmlns:a16="http://schemas.microsoft.com/office/drawing/2014/main" id="{43E6DD45-7B39-1AC3-2536-B836A8C2ABEB}"/>
+              </a:ext>
+            </a:extLst>
+          </p:cNvPr>
+          <p:cNvSpPr/>
+          <p:nvPr/>
+        </p:nvSpPr>
+        <p:spPr>
+          <a:xfrm>
+            <a:off x="7388871" y="3666602"/>
+            <a:ext cx="3817483" cy="1140355"/>
+          </a:xfrm>
+          <a:prstGeom prst="roundRect">
+            <a:avLst/>
+          </a:prstGeom>
+          <a:solidFill>
+            <a:srgbClr val="8D5434"/>
+          </a:solidFill>
+          <a:ln>
+            <a:noFill/>
+          </a:ln>
+        </p:spPr>
+        <p:style>
+          <a:lnRef idx="2">
+            <a:schemeClr val="accent1">
+              <a:shade val="15000"/>
+            </a:schemeClr>
+          </a:lnRef>
+          <a:fillRef idx="1">
+            <a:schemeClr val="accent1"/>
+          </a:fillRef>
+          <a:effectRef idx="0">
+            <a:schemeClr val="accent1"/>
+          </a:effectRef>
+          <a:fontRef idx="minor">
+            <a:schemeClr val="lt1"/>
+          </a:fontRef>
+        </p:style>
+        <p:txBody>
+          <a:bodyPr rtlCol="0" anchor="ctr"/>
+          <a:lstStyle/>
+          <a:p>
+            <a:pPr algn="ctr"/>
+            <a:endParaRPr lang="pt-BR"/>
+          </a:p>
+        </p:txBody>
+      </p:sp>
+      <p:sp>
+        <p:nvSpPr>
           <p:cNvPr id="2" name="TextBox 1">
             <a:extLst>
               <a:ext uri="{FF2B5EF4-FFF2-40B4-BE49-F238E27FC236}">
@@ -8727,9 +9331,9 @@
         <p:grpSpPr>
           <a:xfrm>
             <a:off x="1019215" y="1818058"/>
-            <a:ext cx="10323455" cy="3321013"/>
+            <a:ext cx="10311157" cy="3321013"/>
             <a:chOff x="361669" y="1692069"/>
-            <a:chExt cx="10323455" cy="3321013"/>
+            <a:chExt cx="10311157" cy="3321013"/>
           </a:xfrm>
         </p:grpSpPr>
         <p:sp>
@@ -9066,10 +9670,10 @@
           </p:nvGrpSpPr>
           <p:grpSpPr>
             <a:xfrm>
-              <a:off x="6697756" y="2018839"/>
-              <a:ext cx="3817483" cy="923329"/>
-              <a:chOff x="6611643" y="2063084"/>
-              <a:chExt cx="3817483" cy="923329"/>
+              <a:off x="6697756" y="1889408"/>
+              <a:ext cx="3817483" cy="1140355"/>
+              <a:chOff x="6611643" y="1933653"/>
+              <a:chExt cx="3817483" cy="1140355"/>
             </a:xfrm>
             <a:solidFill>
               <a:srgbClr val="8D5434"/>
@@ -9089,8 +9693,8 @@
             </p:nvSpPr>
             <p:spPr>
               <a:xfrm>
-                <a:off x="6611643" y="2063084"/>
-                <a:ext cx="3817483" cy="923329"/>
+                <a:off x="6611643" y="1933653"/>
+                <a:ext cx="3817483" cy="1140355"/>
               </a:xfrm>
               <a:prstGeom prst="roundRect">
                 <a:avLst/>
@@ -9160,126 +9764,7 @@
                     </a:solidFill>
                     <a:latin typeface="Nunito Sans Normal" pitchFamily="2" charset="0"/>
                   </a:rPr>
-                  <a:t>A customer can only purchase an item if they have visit it</a:t>
-                </a:r>
-                <a:endParaRPr lang="pt-BR" sz="1600" dirty="0">
-                  <a:solidFill>
-                    <a:schemeClr val="bg1"/>
-                  </a:solidFill>
-                </a:endParaRPr>
-              </a:p>
-            </p:txBody>
-          </p:sp>
-        </p:grpSp>
-        <p:grpSp>
-          <p:nvGrpSpPr>
-            <p:cNvPr id="50" name="Group 49">
-              <a:extLst>
-                <a:ext uri="{FF2B5EF4-FFF2-40B4-BE49-F238E27FC236}">
-                  <a16:creationId xmlns:a16="http://schemas.microsoft.com/office/drawing/2014/main" id="{462253ED-99E6-BB2F-42C0-E3D4F7840FBF}"/>
-                </a:ext>
-              </a:extLst>
-            </p:cNvPr>
-            <p:cNvGrpSpPr/>
-            <p:nvPr/>
-          </p:nvGrpSpPr>
-          <p:grpSpPr>
-            <a:xfrm>
-              <a:off x="6611643" y="3666396"/>
-              <a:ext cx="4073481" cy="923329"/>
-              <a:chOff x="6611643" y="3655203"/>
-              <a:chExt cx="4073481" cy="923329"/>
-            </a:xfrm>
-            <a:solidFill>
-              <a:srgbClr val="8D5434"/>
-            </a:solidFill>
-          </p:grpSpPr>
-          <p:sp>
-            <p:nvSpPr>
-              <p:cNvPr id="38" name="Rectangle: Rounded Corners 37">
-                <a:extLst>
-                  <a:ext uri="{FF2B5EF4-FFF2-40B4-BE49-F238E27FC236}">
-                    <a16:creationId xmlns:a16="http://schemas.microsoft.com/office/drawing/2014/main" id="{28A341CD-AFAB-C0C6-4CB5-98F6E189E2AA}"/>
-                  </a:ext>
-                </a:extLst>
-              </p:cNvPr>
-              <p:cNvSpPr/>
-              <p:nvPr/>
-            </p:nvSpPr>
-            <p:spPr>
-              <a:xfrm>
-                <a:off x="6611643" y="3655203"/>
-                <a:ext cx="3903596" cy="923329"/>
-              </a:xfrm>
-              <a:prstGeom prst="roundRect">
-                <a:avLst/>
-              </a:prstGeom>
-              <a:grpFill/>
-              <a:ln>
-                <a:noFill/>
-              </a:ln>
-            </p:spPr>
-            <p:style>
-              <a:lnRef idx="2">
-                <a:schemeClr val="accent1">
-                  <a:shade val="15000"/>
-                </a:schemeClr>
-              </a:lnRef>
-              <a:fillRef idx="1">
-                <a:schemeClr val="accent1"/>
-              </a:fillRef>
-              <a:effectRef idx="0">
-                <a:schemeClr val="accent1"/>
-              </a:effectRef>
-              <a:fontRef idx="minor">
-                <a:schemeClr val="lt1"/>
-              </a:fontRef>
-            </p:style>
-            <p:txBody>
-              <a:bodyPr rtlCol="0" anchor="ctr"/>
-              <a:lstStyle/>
-              <a:p>
-                <a:pPr algn="ctr"/>
-                <a:endParaRPr lang="pt-BR"/>
-              </a:p>
-            </p:txBody>
-          </p:sp>
-          <p:sp>
-            <p:nvSpPr>
-              <p:cNvPr id="43" name="TextBox 42">
-                <a:extLst>
-                  <a:ext uri="{FF2B5EF4-FFF2-40B4-BE49-F238E27FC236}">
-                    <a16:creationId xmlns:a16="http://schemas.microsoft.com/office/drawing/2014/main" id="{EBD745B3-7529-A9F2-91D8-0D633E047AA8}"/>
-                  </a:ext>
-                </a:extLst>
-              </p:cNvPr>
-              <p:cNvSpPr txBox="1"/>
-              <p:nvPr/>
-            </p:nvSpPr>
-            <p:spPr>
-              <a:xfrm>
-                <a:off x="7041741" y="3703785"/>
-                <a:ext cx="3643383" cy="830997"/>
-              </a:xfrm>
-              <a:prstGeom prst="rect">
-                <a:avLst/>
-              </a:prstGeom>
-              <a:noFill/>
-            </p:spPr>
-            <p:txBody>
-              <a:bodyPr wrap="square">
-                <a:spAutoFit/>
-              </a:bodyPr>
-              <a:lstStyle/>
-              <a:p>
-                <a:r>
-                  <a:rPr lang="en-US" sz="1600" dirty="0">
-                    <a:solidFill>
-                      <a:schemeClr val="bg1"/>
-                    </a:solidFill>
-                    <a:latin typeface="Nunito Sans Normal" pitchFamily="2" charset="0"/>
-                  </a:rPr>
-                  <a:t>The date of the last visit of the customer for </a:t>
+                  <a:t>A customer can </a:t>
                 </a:r>
                 <a:r>
                   <a:rPr lang="en-US" sz="1600" b="1" dirty="0">
@@ -9288,7 +9773,7 @@
                     </a:solidFill>
                     <a:latin typeface="Nunito Sans Normal" pitchFamily="2" charset="0"/>
                   </a:rPr>
-                  <a:t>that specific campaign is the one they converted</a:t>
+                  <a:t>only purchase an item if they have visit it</a:t>
                 </a:r>
                 <a:endParaRPr lang="pt-BR" sz="1600" b="1" dirty="0">
                   <a:solidFill>
@@ -9299,6 +9784,60 @@
             </p:txBody>
           </p:sp>
         </p:grpSp>
+        <p:sp>
+          <p:nvSpPr>
+            <p:cNvPr id="43" name="TextBox 42">
+              <a:extLst>
+                <a:ext uri="{FF2B5EF4-FFF2-40B4-BE49-F238E27FC236}">
+                  <a16:creationId xmlns:a16="http://schemas.microsoft.com/office/drawing/2014/main" id="{EBD745B3-7529-A9F2-91D8-0D633E047AA8}"/>
+                </a:ext>
+              </a:extLst>
+            </p:cNvPr>
+            <p:cNvSpPr txBox="1"/>
+            <p:nvPr/>
+          </p:nvSpPr>
+          <p:spPr>
+            <a:xfrm>
+              <a:off x="7029443" y="3578259"/>
+              <a:ext cx="3643383" cy="1077218"/>
+            </a:xfrm>
+            <a:prstGeom prst="rect">
+              <a:avLst/>
+            </a:prstGeom>
+            <a:noFill/>
+          </p:spPr>
+          <p:txBody>
+            <a:bodyPr wrap="square">
+              <a:spAutoFit/>
+            </a:bodyPr>
+            <a:lstStyle/>
+            <a:p>
+              <a:r>
+                <a:rPr lang="en-US" sz="1600" dirty="0">
+                  <a:solidFill>
+                    <a:schemeClr val="bg1"/>
+                  </a:solidFill>
+                  <a:latin typeface="Nunito Sans Normal" pitchFamily="2" charset="0"/>
+                </a:rPr>
+                <a:t>The date of the last visit of the customer for </a:t>
+              </a:r>
+              <a:r>
+                <a:rPr lang="en-US" sz="1600" b="1" dirty="0">
+                  <a:solidFill>
+                    <a:schemeClr val="bg1"/>
+                  </a:solidFill>
+                  <a:latin typeface="Nunito Sans Normal" pitchFamily="2" charset="0"/>
+                </a:rPr>
+                <a:t>that specific campaign is the one they converted if available in purchases and visits</a:t>
+              </a:r>
+              <a:endParaRPr lang="pt-BR" sz="1600" b="1" dirty="0">
+                <a:solidFill>
+                  <a:schemeClr val="bg1"/>
+                </a:solidFill>
+              </a:endParaRPr>
+            </a:p>
+          </p:txBody>
+        </p:sp>
         <p:pic>
           <p:nvPicPr>
             <p:cNvPr id="46" name="Graphic 45" descr="Badge 1 with solid fill">
@@ -9463,7 +10002,406 @@
 </p:sld>
 </file>
 
-<file path=ppt/slides/slide19.xml><?xml version="1.0" encoding="utf-8"?>
+<file path=ppt/slides/slide2.xml><?xml version="1.0" encoding="utf-8"?>
+<p:sld xmlns:a="http://schemas.openxmlformats.org/drawingml/2006/main" xmlns:r="http://schemas.openxmlformats.org/officeDocument/2006/relationships" xmlns:p="http://schemas.openxmlformats.org/presentationml/2006/main">
+  <p:cSld>
+    <p:spTree>
+      <p:nvGrpSpPr>
+        <p:cNvPr id="1" name=""/>
+        <p:cNvGrpSpPr/>
+        <p:nvPr/>
+      </p:nvGrpSpPr>
+      <p:grpSpPr>
+        <a:xfrm>
+          <a:off x="0" y="0"/>
+          <a:ext cx="0" cy="0"/>
+          <a:chOff x="0" y="0"/>
+          <a:chExt cx="0" cy="0"/>
+        </a:xfrm>
+      </p:grpSpPr>
+      <p:sp>
+        <p:nvSpPr>
+          <p:cNvPr id="6" name="Rectangle 5">
+            <a:extLst>
+              <a:ext uri="{FF2B5EF4-FFF2-40B4-BE49-F238E27FC236}">
+                <a16:creationId xmlns:a16="http://schemas.microsoft.com/office/drawing/2014/main" id="{05CC7DF3-D1AF-722B-182D-F6B27D25CB20}"/>
+              </a:ext>
+            </a:extLst>
+          </p:cNvPr>
+          <p:cNvSpPr/>
+          <p:nvPr/>
+        </p:nvSpPr>
+        <p:spPr>
+          <a:xfrm>
+            <a:off x="7846142" y="0"/>
+            <a:ext cx="4345857" cy="6858000"/>
+          </a:xfrm>
+          <a:prstGeom prst="rect">
+            <a:avLst/>
+          </a:prstGeom>
+          <a:solidFill>
+            <a:srgbClr val="FEBAA8"/>
+          </a:solidFill>
+          <a:ln>
+            <a:noFill/>
+          </a:ln>
+        </p:spPr>
+        <p:style>
+          <a:lnRef idx="2">
+            <a:schemeClr val="accent1">
+              <a:shade val="15000"/>
+            </a:schemeClr>
+          </a:lnRef>
+          <a:fillRef idx="1">
+            <a:schemeClr val="accent1"/>
+          </a:fillRef>
+          <a:effectRef idx="0">
+            <a:schemeClr val="accent1"/>
+          </a:effectRef>
+          <a:fontRef idx="minor">
+            <a:schemeClr val="lt1"/>
+          </a:fontRef>
+        </p:style>
+        <p:txBody>
+          <a:bodyPr rtlCol="0" anchor="ctr"/>
+          <a:lstStyle/>
+          <a:p>
+            <a:pPr algn="ctr"/>
+            <a:endParaRPr lang="pt-BR"/>
+          </a:p>
+        </p:txBody>
+      </p:sp>
+      <p:sp>
+        <p:nvSpPr>
+          <p:cNvPr id="4" name="TextBox 3">
+            <a:extLst>
+              <a:ext uri="{FF2B5EF4-FFF2-40B4-BE49-F238E27FC236}">
+                <a16:creationId xmlns:a16="http://schemas.microsoft.com/office/drawing/2014/main" id="{9430201B-88D4-4A70-4B46-066FA1B4E4FC}"/>
+              </a:ext>
+            </a:extLst>
+          </p:cNvPr>
+          <p:cNvSpPr txBox="1"/>
+          <p:nvPr/>
+        </p:nvSpPr>
+        <p:spPr>
+          <a:xfrm>
+            <a:off x="299694" y="1011660"/>
+            <a:ext cx="6882581" cy="5755422"/>
+          </a:xfrm>
+          <a:prstGeom prst="rect">
+            <a:avLst/>
+          </a:prstGeom>
+          <a:noFill/>
+        </p:spPr>
+        <p:txBody>
+          <a:bodyPr wrap="square" rtlCol="0">
+            <a:spAutoFit/>
+          </a:bodyPr>
+          <a:lstStyle/>
+          <a:p>
+            <a:pPr marL="457200" indent="-457200">
+              <a:buFont typeface="+mj-lt"/>
+              <a:buAutoNum type="arabicPeriod"/>
+            </a:pPr>
+            <a:r>
+              <a:rPr lang="pt-BR" sz="1600" b="1" dirty="0">
+                <a:latin typeface="Nunito Sans Normal" pitchFamily="2" charset="0"/>
+              </a:rPr>
+              <a:t>Problem Definition</a:t>
+            </a:r>
+          </a:p>
+          <a:p>
+            <a:pPr lvl="1"/>
+            <a:r>
+              <a:rPr lang="pt-BR" sz="1600" b="1" dirty="0">
+                <a:latin typeface="Nunito Sans Normal" pitchFamily="2" charset="0"/>
+              </a:rPr>
+              <a:t>	</a:t>
+            </a:r>
+            <a:r>
+              <a:rPr lang="pt-BR" sz="1600" dirty="0">
+                <a:latin typeface="Nunito Sans Normal" pitchFamily="2" charset="0"/>
+              </a:rPr>
+              <a:t>1.1 Dataset Attributes</a:t>
+            </a:r>
+          </a:p>
+          <a:p>
+            <a:pPr lvl="1"/>
+            <a:r>
+              <a:rPr lang="pt-BR" sz="1600" dirty="0">
+                <a:latin typeface="Nunito Sans Normal" pitchFamily="2" charset="0"/>
+              </a:rPr>
+              <a:t>	1.2 Objective and Key Questions</a:t>
+            </a:r>
+          </a:p>
+          <a:p>
+            <a:pPr lvl="1"/>
+            <a:r>
+              <a:rPr lang="pt-BR" sz="1600" dirty="0">
+                <a:latin typeface="Nunito Sans Normal" pitchFamily="2" charset="0"/>
+              </a:rPr>
+              <a:t>	1.3 Technologies and Programming Language</a:t>
+            </a:r>
+          </a:p>
+          <a:p>
+            <a:pPr lvl="1"/>
+            <a:endParaRPr lang="pt-BR" sz="1600" dirty="0">
+              <a:latin typeface="Nunito Sans Normal" pitchFamily="2" charset="0"/>
+            </a:endParaRPr>
+          </a:p>
+          <a:p>
+            <a:pPr marL="457200" indent="-457200">
+              <a:buAutoNum type="arabicPeriod"/>
+            </a:pPr>
+            <a:r>
+              <a:rPr lang="pt-BR" sz="1600" b="1" dirty="0">
+                <a:latin typeface="Nunito Sans Normal" pitchFamily="2" charset="0"/>
+              </a:rPr>
+              <a:t>First Steps</a:t>
+            </a:r>
+          </a:p>
+          <a:p>
+            <a:pPr marL="457200" indent="-457200">
+              <a:buAutoNum type="arabicPeriod"/>
+            </a:pPr>
+            <a:r>
+              <a:rPr lang="pt-BR" sz="1600" b="1" dirty="0">
+                <a:latin typeface="Nunito Sans Normal" pitchFamily="2" charset="0"/>
+              </a:rPr>
+              <a:t>Data GAP</a:t>
+            </a:r>
+          </a:p>
+          <a:p>
+            <a:r>
+              <a:rPr lang="pt-BR" sz="1600" b="1" dirty="0">
+                <a:latin typeface="Nunito Sans Normal" pitchFamily="2" charset="0"/>
+              </a:rPr>
+              <a:t>	3.1 Campaign ID</a:t>
+            </a:r>
+          </a:p>
+          <a:p>
+            <a:r>
+              <a:rPr lang="pt-BR" sz="1600" b="1" dirty="0">
+                <a:latin typeface="Nunito Sans Normal" pitchFamily="2" charset="0"/>
+              </a:rPr>
+              <a:t>	3.2 User ID</a:t>
+            </a:r>
+          </a:p>
+          <a:p>
+            <a:r>
+              <a:rPr lang="pt-BR" sz="1600" b="1" dirty="0">
+                <a:latin typeface="Nunito Sans Normal" pitchFamily="2" charset="0"/>
+              </a:rPr>
+              <a:t>	3.3 Nulls, NaNs and Missings</a:t>
+            </a:r>
+          </a:p>
+          <a:p>
+            <a:r>
+              <a:rPr lang="pt-BR" sz="1600" b="1" dirty="0">
+                <a:latin typeface="Nunito Sans Normal" pitchFamily="2" charset="0"/>
+              </a:rPr>
+              <a:t>	3.4 Wrong Campaign</a:t>
+            </a:r>
+          </a:p>
+          <a:p>
+            <a:r>
+              <a:rPr lang="pt-BR" sz="1600" b="1" dirty="0">
+                <a:latin typeface="Nunito Sans Normal" pitchFamily="2" charset="0"/>
+              </a:rPr>
+              <a:t>	3.5 Inconsistence in Window Number</a:t>
+            </a:r>
+          </a:p>
+          <a:p>
+            <a:r>
+              <a:rPr lang="pt-BR" sz="1600" b="1" dirty="0">
+                <a:latin typeface="Nunito Sans Normal" pitchFamily="2" charset="0"/>
+              </a:rPr>
+              <a:t>	3.6 Missing PK</a:t>
+            </a:r>
+          </a:p>
+          <a:p>
+            <a:r>
+              <a:rPr lang="pt-BR" sz="1600" b="1" dirty="0">
+                <a:latin typeface="Nunito Sans Normal" pitchFamily="2" charset="0"/>
+              </a:rPr>
+              <a:t>	3.7 N:N Relationship</a:t>
+            </a:r>
+          </a:p>
+          <a:p>
+            <a:r>
+              <a:rPr lang="pt-BR" sz="1600" b="1" dirty="0">
+                <a:latin typeface="Nunito Sans Normal" pitchFamily="2" charset="0"/>
+              </a:rPr>
+              <a:t>	3.8 Non Attributed Channel</a:t>
+            </a:r>
+          </a:p>
+          <a:p>
+            <a:endParaRPr lang="pt-BR" sz="1600" b="1" dirty="0">
+              <a:latin typeface="Nunito Sans Normal" pitchFamily="2" charset="0"/>
+            </a:endParaRPr>
+          </a:p>
+          <a:p>
+            <a:r>
+              <a:rPr lang="pt-BR" sz="1600" b="1" dirty="0">
+                <a:latin typeface="Nunito Sans Normal" pitchFamily="2" charset="0"/>
+              </a:rPr>
+              <a:t>4.     Data Analysis</a:t>
+            </a:r>
+          </a:p>
+          <a:p>
+            <a:pPr lvl="2"/>
+            <a:r>
+              <a:rPr lang="pt-BR" sz="1600" dirty="0">
+                <a:latin typeface="Nunito Sans Normal" pitchFamily="2" charset="0"/>
+              </a:rPr>
+              <a:t>4.1 Valuable Users</a:t>
+            </a:r>
+          </a:p>
+          <a:p>
+            <a:pPr lvl="2"/>
+            <a:r>
+              <a:rPr lang="pt-BR" sz="1600" dirty="0">
+                <a:latin typeface="Nunito Sans Normal" pitchFamily="2" charset="0"/>
+              </a:rPr>
+              <a:t>4.2 Channels &amp; Valuable Users</a:t>
+            </a:r>
+          </a:p>
+          <a:p>
+            <a:pPr lvl="2"/>
+            <a:r>
+              <a:rPr lang="pt-BR" sz="1600" dirty="0">
+                <a:latin typeface="Nunito Sans Normal" pitchFamily="2" charset="0"/>
+              </a:rPr>
+              <a:t>4.3 Convertion Rate</a:t>
+            </a:r>
+          </a:p>
+          <a:p>
+            <a:pPr lvl="2"/>
+            <a:r>
+              <a:rPr lang="pt-BR" sz="1600" dirty="0">
+                <a:latin typeface="Nunito Sans Normal" pitchFamily="2" charset="0"/>
+              </a:rPr>
+              <a:t>4.4 Recommendations</a:t>
+            </a:r>
+          </a:p>
+          <a:p>
+            <a:pPr lvl="1"/>
+            <a:endParaRPr lang="pt-BR" sz="1600" dirty="0">
+              <a:latin typeface="Nunito Sans Normal" pitchFamily="2" charset="0"/>
+            </a:endParaRPr>
+          </a:p>
+          <a:p>
+            <a:r>
+              <a:rPr lang="pt-BR" sz="1600" b="1" dirty="0">
+                <a:latin typeface="Nunito Sans Normal" pitchFamily="2" charset="0"/>
+              </a:rPr>
+              <a:t>5.     Recommendations</a:t>
+            </a:r>
+          </a:p>
+        </p:txBody>
+      </p:sp>
+      <p:sp>
+        <p:nvSpPr>
+          <p:cNvPr id="3" name="TextBox 2">
+            <a:extLst>
+              <a:ext uri="{FF2B5EF4-FFF2-40B4-BE49-F238E27FC236}">
+                <a16:creationId xmlns:a16="http://schemas.microsoft.com/office/drawing/2014/main" id="{6005DEB9-7AB9-EE71-2DA6-8D98DE683D63}"/>
+              </a:ext>
+            </a:extLst>
+          </p:cNvPr>
+          <p:cNvSpPr txBox="1"/>
+          <p:nvPr/>
+        </p:nvSpPr>
+        <p:spPr>
+          <a:xfrm>
+            <a:off x="2863645" y="200188"/>
+            <a:ext cx="2261419" cy="707886"/>
+          </a:xfrm>
+          <a:prstGeom prst="rect">
+            <a:avLst/>
+          </a:prstGeom>
+          <a:noFill/>
+        </p:spPr>
+        <p:txBody>
+          <a:bodyPr wrap="square">
+            <a:spAutoFit/>
+          </a:bodyPr>
+          <a:lstStyle/>
+          <a:p>
+            <a:pPr algn="ctr"/>
+            <a:r>
+              <a:rPr lang="pt-BR" sz="4000" b="1" dirty="0">
+                <a:latin typeface="Nunito Sans Normal" pitchFamily="2" charset="0"/>
+              </a:rPr>
+              <a:t>INDEX</a:t>
+            </a:r>
+            <a:endParaRPr lang="pt-BR" sz="2800" b="1" dirty="0">
+              <a:latin typeface="Nunito Sans Normal" pitchFamily="2" charset="0"/>
+            </a:endParaRPr>
+          </a:p>
+        </p:txBody>
+      </p:sp>
+      <p:pic>
+        <p:nvPicPr>
+          <p:cNvPr id="1026" name="Picture 2" descr="FabFitFun - Beauty, Fitness, Lifestyle">
+            <a:extLst>
+              <a:ext uri="{FF2B5EF4-FFF2-40B4-BE49-F238E27FC236}">
+                <a16:creationId xmlns:a16="http://schemas.microsoft.com/office/drawing/2014/main" id="{5264F99C-3745-DC5D-0BC5-F5B5A7511BB5}"/>
+              </a:ext>
+            </a:extLst>
+          </p:cNvPr>
+          <p:cNvPicPr>
+            <a:picLocks noChangeAspect="1" noChangeArrowheads="1"/>
+          </p:cNvPicPr>
+          <p:nvPr/>
+        </p:nvPicPr>
+        <p:blipFill>
+          <a:blip r:embed="rId3">
+            <a:extLst>
+              <a:ext uri="{28A0092B-C50C-407E-A947-70E740481C1C}">
+                <a14:useLocalDpi xmlns:a14="http://schemas.microsoft.com/office/drawing/2010/main" val="0"/>
+              </a:ext>
+            </a:extLst>
+          </a:blip>
+          <a:srcRect/>
+          <a:stretch>
+            <a:fillRect/>
+          </a:stretch>
+        </p:blipFill>
+        <p:spPr bwMode="auto">
+          <a:xfrm>
+            <a:off x="10053486" y="5886204"/>
+            <a:ext cx="1759973" cy="725989"/>
+          </a:xfrm>
+          <a:prstGeom prst="rect">
+            <a:avLst/>
+          </a:prstGeom>
+          <a:noFill/>
+          <a:extLst>
+            <a:ext uri="{909E8E84-426E-40DD-AFC4-6F175D3DCCD1}">
+              <a14:hiddenFill xmlns:a14="http://schemas.microsoft.com/office/drawing/2010/main">
+                <a:solidFill>
+                  <a:srgbClr val="FFFFFF"/>
+                </a:solidFill>
+              </a14:hiddenFill>
+            </a:ext>
+          </a:extLst>
+        </p:spPr>
+      </p:pic>
+    </p:spTree>
+    <p:extLst>
+      <p:ext uri="{BB962C8B-B14F-4D97-AF65-F5344CB8AC3E}">
+        <p14:creationId xmlns:p14="http://schemas.microsoft.com/office/powerpoint/2010/main" val="3294185420"/>
+      </p:ext>
+    </p:extLst>
+  </p:cSld>
+  <p:clrMapOvr>
+    <a:masterClrMapping/>
+  </p:clrMapOvr>
+</p:sld>
+</file>
+
+<file path=ppt/slides/slide20.xml><?xml version="1.0" encoding="utf-8"?>
 <p:sld xmlns:a="http://schemas.openxmlformats.org/drawingml/2006/main" xmlns:r="http://schemas.openxmlformats.org/officeDocument/2006/relationships" xmlns:p="http://schemas.openxmlformats.org/presentationml/2006/main">
   <p:cSld>
     <p:spTree>
@@ -10384,398 +11322,7 @@
 </p:sld>
 </file>
 
-<file path=ppt/slides/slide2.xml><?xml version="1.0" encoding="utf-8"?>
-<p:sld xmlns:a="http://schemas.openxmlformats.org/drawingml/2006/main" xmlns:r="http://schemas.openxmlformats.org/officeDocument/2006/relationships" xmlns:p="http://schemas.openxmlformats.org/presentationml/2006/main">
-  <p:cSld>
-    <p:spTree>
-      <p:nvGrpSpPr>
-        <p:cNvPr id="1" name=""/>
-        <p:cNvGrpSpPr/>
-        <p:nvPr/>
-      </p:nvGrpSpPr>
-      <p:grpSpPr>
-        <a:xfrm>
-          <a:off x="0" y="0"/>
-          <a:ext cx="0" cy="0"/>
-          <a:chOff x="0" y="0"/>
-          <a:chExt cx="0" cy="0"/>
-        </a:xfrm>
-      </p:grpSpPr>
-      <p:sp>
-        <p:nvSpPr>
-          <p:cNvPr id="6" name="Rectangle 5">
-            <a:extLst>
-              <a:ext uri="{FF2B5EF4-FFF2-40B4-BE49-F238E27FC236}">
-                <a16:creationId xmlns:a16="http://schemas.microsoft.com/office/drawing/2014/main" id="{05CC7DF3-D1AF-722B-182D-F6B27D25CB20}"/>
-              </a:ext>
-            </a:extLst>
-          </p:cNvPr>
-          <p:cNvSpPr/>
-          <p:nvPr/>
-        </p:nvSpPr>
-        <p:spPr>
-          <a:xfrm>
-            <a:off x="7846142" y="0"/>
-            <a:ext cx="4345857" cy="6858000"/>
-          </a:xfrm>
-          <a:prstGeom prst="rect">
-            <a:avLst/>
-          </a:prstGeom>
-          <a:solidFill>
-            <a:srgbClr val="FEBAA8"/>
-          </a:solidFill>
-          <a:ln>
-            <a:noFill/>
-          </a:ln>
-        </p:spPr>
-        <p:style>
-          <a:lnRef idx="2">
-            <a:schemeClr val="accent1">
-              <a:shade val="15000"/>
-            </a:schemeClr>
-          </a:lnRef>
-          <a:fillRef idx="1">
-            <a:schemeClr val="accent1"/>
-          </a:fillRef>
-          <a:effectRef idx="0">
-            <a:schemeClr val="accent1"/>
-          </a:effectRef>
-          <a:fontRef idx="minor">
-            <a:schemeClr val="lt1"/>
-          </a:fontRef>
-        </p:style>
-        <p:txBody>
-          <a:bodyPr rtlCol="0" anchor="ctr"/>
-          <a:lstStyle/>
-          <a:p>
-            <a:pPr algn="ctr"/>
-            <a:endParaRPr lang="pt-BR"/>
-          </a:p>
-        </p:txBody>
-      </p:sp>
-      <p:sp>
-        <p:nvSpPr>
-          <p:cNvPr id="4" name="TextBox 3">
-            <a:extLst>
-              <a:ext uri="{FF2B5EF4-FFF2-40B4-BE49-F238E27FC236}">
-                <a16:creationId xmlns:a16="http://schemas.microsoft.com/office/drawing/2014/main" id="{9430201B-88D4-4A70-4B46-066FA1B4E4FC}"/>
-              </a:ext>
-            </a:extLst>
-          </p:cNvPr>
-          <p:cNvSpPr txBox="1"/>
-          <p:nvPr/>
-        </p:nvSpPr>
-        <p:spPr>
-          <a:xfrm>
-            <a:off x="299694" y="1011660"/>
-            <a:ext cx="6882581" cy="5509200"/>
-          </a:xfrm>
-          <a:prstGeom prst="rect">
-            <a:avLst/>
-          </a:prstGeom>
-          <a:noFill/>
-        </p:spPr>
-        <p:txBody>
-          <a:bodyPr wrap="square" rtlCol="0">
-            <a:spAutoFit/>
-          </a:bodyPr>
-          <a:lstStyle/>
-          <a:p>
-            <a:pPr marL="457200" indent="-457200">
-              <a:buFont typeface="+mj-lt"/>
-              <a:buAutoNum type="arabicPeriod"/>
-            </a:pPr>
-            <a:r>
-              <a:rPr lang="pt-BR" sz="1600" b="1" dirty="0">
-                <a:latin typeface="Nunito Sans Normal" pitchFamily="2" charset="0"/>
-              </a:rPr>
-              <a:t>Problem Definition</a:t>
-            </a:r>
-          </a:p>
-          <a:p>
-            <a:pPr lvl="1"/>
-            <a:r>
-              <a:rPr lang="pt-BR" sz="1600" b="1" dirty="0">
-                <a:latin typeface="Nunito Sans Normal" pitchFamily="2" charset="0"/>
-              </a:rPr>
-              <a:t>	</a:t>
-            </a:r>
-            <a:r>
-              <a:rPr lang="pt-BR" sz="1600" dirty="0">
-                <a:latin typeface="Nunito Sans Normal" pitchFamily="2" charset="0"/>
-              </a:rPr>
-              <a:t>1.1 Dataset Attributes</a:t>
-            </a:r>
-          </a:p>
-          <a:p>
-            <a:pPr lvl="1"/>
-            <a:r>
-              <a:rPr lang="pt-BR" sz="1600" dirty="0">
-                <a:latin typeface="Nunito Sans Normal" pitchFamily="2" charset="0"/>
-              </a:rPr>
-              <a:t>	1.2 Objective and Key Questions</a:t>
-            </a:r>
-          </a:p>
-          <a:p>
-            <a:pPr lvl="1"/>
-            <a:r>
-              <a:rPr lang="pt-BR" sz="1600" dirty="0">
-                <a:latin typeface="Nunito Sans Normal" pitchFamily="2" charset="0"/>
-              </a:rPr>
-              <a:t>	1.3 Technologies and Programming Language</a:t>
-            </a:r>
-          </a:p>
-          <a:p>
-            <a:pPr lvl="1"/>
-            <a:endParaRPr lang="pt-BR" sz="1600" dirty="0">
-              <a:latin typeface="Nunito Sans Normal" pitchFamily="2" charset="0"/>
-            </a:endParaRPr>
-          </a:p>
-          <a:p>
-            <a:pPr marL="457200" indent="-457200">
-              <a:buAutoNum type="arabicPeriod"/>
-            </a:pPr>
-            <a:r>
-              <a:rPr lang="pt-BR" sz="1600" b="1" dirty="0">
-                <a:latin typeface="Nunito Sans Normal" pitchFamily="2" charset="0"/>
-              </a:rPr>
-              <a:t>First Steps</a:t>
-            </a:r>
-          </a:p>
-          <a:p>
-            <a:pPr marL="457200" indent="-457200">
-              <a:buAutoNum type="arabicPeriod"/>
-            </a:pPr>
-            <a:r>
-              <a:rPr lang="pt-BR" sz="1600" b="1" dirty="0">
-                <a:latin typeface="Nunito Sans Normal" pitchFamily="2" charset="0"/>
-              </a:rPr>
-              <a:t>Data GAP</a:t>
-            </a:r>
-          </a:p>
-          <a:p>
-            <a:r>
-              <a:rPr lang="pt-BR" sz="1600" b="1" dirty="0">
-                <a:latin typeface="Nunito Sans Normal" pitchFamily="2" charset="0"/>
-              </a:rPr>
-              <a:t>	3.1 Campaign ID</a:t>
-            </a:r>
-          </a:p>
-          <a:p>
-            <a:r>
-              <a:rPr lang="pt-BR" sz="1600" b="1" dirty="0">
-                <a:latin typeface="Nunito Sans Normal" pitchFamily="2" charset="0"/>
-              </a:rPr>
-              <a:t>	3.2 User ID</a:t>
-            </a:r>
-          </a:p>
-          <a:p>
-            <a:r>
-              <a:rPr lang="pt-BR" sz="1600" b="1" dirty="0">
-                <a:latin typeface="Nunito Sans Normal" pitchFamily="2" charset="0"/>
-              </a:rPr>
-              <a:t>	3.3 Nulls, NaNs and Missings</a:t>
-            </a:r>
-          </a:p>
-          <a:p>
-            <a:r>
-              <a:rPr lang="pt-BR" sz="1600" b="1" dirty="0">
-                <a:latin typeface="Nunito Sans Normal" pitchFamily="2" charset="0"/>
-              </a:rPr>
-              <a:t>	3.4 Wrong Campaign</a:t>
-            </a:r>
-          </a:p>
-          <a:p>
-            <a:r>
-              <a:rPr lang="pt-BR" sz="1600" b="1" dirty="0">
-                <a:latin typeface="Nunito Sans Normal" pitchFamily="2" charset="0"/>
-              </a:rPr>
-              <a:t>	3.5 Inconsistence in Window Number</a:t>
-            </a:r>
-          </a:p>
-          <a:p>
-            <a:r>
-              <a:rPr lang="pt-BR" sz="1600" b="1" dirty="0">
-                <a:latin typeface="Nunito Sans Normal" pitchFamily="2" charset="0"/>
-              </a:rPr>
-              <a:t>	3.6 Missing PK</a:t>
-            </a:r>
-          </a:p>
-          <a:p>
-            <a:r>
-              <a:rPr lang="pt-BR" sz="1600" b="1" dirty="0">
-                <a:latin typeface="Nunito Sans Normal" pitchFamily="2" charset="0"/>
-              </a:rPr>
-              <a:t>	3.7 N:N Relationship</a:t>
-            </a:r>
-          </a:p>
-          <a:p>
-            <a:endParaRPr lang="pt-BR" sz="1600" b="1" dirty="0">
-              <a:latin typeface="Nunito Sans Normal" pitchFamily="2" charset="0"/>
-            </a:endParaRPr>
-          </a:p>
-          <a:p>
-            <a:r>
-              <a:rPr lang="pt-BR" sz="1600" b="1" dirty="0">
-                <a:latin typeface="Nunito Sans Normal" pitchFamily="2" charset="0"/>
-              </a:rPr>
-              <a:t>4.     Data Analysis</a:t>
-            </a:r>
-          </a:p>
-          <a:p>
-            <a:pPr lvl="2"/>
-            <a:r>
-              <a:rPr lang="pt-BR" sz="1600" dirty="0">
-                <a:latin typeface="Nunito Sans Normal" pitchFamily="2" charset="0"/>
-              </a:rPr>
-              <a:t>4.1 Valuable Users</a:t>
-            </a:r>
-          </a:p>
-          <a:p>
-            <a:pPr lvl="2"/>
-            <a:r>
-              <a:rPr lang="pt-BR" sz="1600" dirty="0">
-                <a:latin typeface="Nunito Sans Normal" pitchFamily="2" charset="0"/>
-              </a:rPr>
-              <a:t>4.2 Channels &amp; Valuable Users</a:t>
-            </a:r>
-          </a:p>
-          <a:p>
-            <a:pPr lvl="2"/>
-            <a:r>
-              <a:rPr lang="pt-BR" sz="1600" dirty="0">
-                <a:latin typeface="Nunito Sans Normal" pitchFamily="2" charset="0"/>
-              </a:rPr>
-              <a:t>4.3 Convertion Rate</a:t>
-            </a:r>
-          </a:p>
-          <a:p>
-            <a:pPr lvl="2"/>
-            <a:r>
-              <a:rPr lang="pt-BR" sz="1600" dirty="0">
-                <a:latin typeface="Nunito Sans Normal" pitchFamily="2" charset="0"/>
-              </a:rPr>
-              <a:t>4.4 Recommendations</a:t>
-            </a:r>
-          </a:p>
-          <a:p>
-            <a:pPr lvl="1"/>
-            <a:endParaRPr lang="pt-BR" sz="1600" dirty="0">
-              <a:latin typeface="Nunito Sans Normal" pitchFamily="2" charset="0"/>
-            </a:endParaRPr>
-          </a:p>
-          <a:p>
-            <a:r>
-              <a:rPr lang="pt-BR" sz="1600" b="1" dirty="0">
-                <a:latin typeface="Nunito Sans Normal" pitchFamily="2" charset="0"/>
-              </a:rPr>
-              <a:t>5.     Recommendations</a:t>
-            </a:r>
-          </a:p>
-        </p:txBody>
-      </p:sp>
-      <p:sp>
-        <p:nvSpPr>
-          <p:cNvPr id="3" name="TextBox 2">
-            <a:extLst>
-              <a:ext uri="{FF2B5EF4-FFF2-40B4-BE49-F238E27FC236}">
-                <a16:creationId xmlns:a16="http://schemas.microsoft.com/office/drawing/2014/main" id="{6005DEB9-7AB9-EE71-2DA6-8D98DE683D63}"/>
-              </a:ext>
-            </a:extLst>
-          </p:cNvPr>
-          <p:cNvSpPr txBox="1"/>
-          <p:nvPr/>
-        </p:nvSpPr>
-        <p:spPr>
-          <a:xfrm>
-            <a:off x="2863645" y="200188"/>
-            <a:ext cx="2261419" cy="707886"/>
-          </a:xfrm>
-          <a:prstGeom prst="rect">
-            <a:avLst/>
-          </a:prstGeom>
-          <a:noFill/>
-        </p:spPr>
-        <p:txBody>
-          <a:bodyPr wrap="square">
-            <a:spAutoFit/>
-          </a:bodyPr>
-          <a:lstStyle/>
-          <a:p>
-            <a:pPr algn="ctr"/>
-            <a:r>
-              <a:rPr lang="pt-BR" sz="4000" b="1" dirty="0">
-                <a:latin typeface="Nunito Sans Normal" pitchFamily="2" charset="0"/>
-              </a:rPr>
-              <a:t>INDEX</a:t>
-            </a:r>
-            <a:endParaRPr lang="pt-BR" sz="2800" b="1" dirty="0">
-              <a:latin typeface="Nunito Sans Normal" pitchFamily="2" charset="0"/>
-            </a:endParaRPr>
-          </a:p>
-        </p:txBody>
-      </p:sp>
-      <p:pic>
-        <p:nvPicPr>
-          <p:cNvPr id="1026" name="Picture 2" descr="FabFitFun - Beauty, Fitness, Lifestyle">
-            <a:extLst>
-              <a:ext uri="{FF2B5EF4-FFF2-40B4-BE49-F238E27FC236}">
-                <a16:creationId xmlns:a16="http://schemas.microsoft.com/office/drawing/2014/main" id="{5264F99C-3745-DC5D-0BC5-F5B5A7511BB5}"/>
-              </a:ext>
-            </a:extLst>
-          </p:cNvPr>
-          <p:cNvPicPr>
-            <a:picLocks noChangeAspect="1" noChangeArrowheads="1"/>
-          </p:cNvPicPr>
-          <p:nvPr/>
-        </p:nvPicPr>
-        <p:blipFill>
-          <a:blip r:embed="rId3">
-            <a:extLst>
-              <a:ext uri="{28A0092B-C50C-407E-A947-70E740481C1C}">
-                <a14:useLocalDpi xmlns:a14="http://schemas.microsoft.com/office/drawing/2010/main" val="0"/>
-              </a:ext>
-            </a:extLst>
-          </a:blip>
-          <a:srcRect/>
-          <a:stretch>
-            <a:fillRect/>
-          </a:stretch>
-        </p:blipFill>
-        <p:spPr bwMode="auto">
-          <a:xfrm>
-            <a:off x="10053486" y="5886204"/>
-            <a:ext cx="1759973" cy="725989"/>
-          </a:xfrm>
-          <a:prstGeom prst="rect">
-            <a:avLst/>
-          </a:prstGeom>
-          <a:noFill/>
-          <a:extLst>
-            <a:ext uri="{909E8E84-426E-40DD-AFC4-6F175D3DCCD1}">
-              <a14:hiddenFill xmlns:a14="http://schemas.microsoft.com/office/drawing/2010/main">
-                <a:solidFill>
-                  <a:srgbClr val="FFFFFF"/>
-                </a:solidFill>
-              </a14:hiddenFill>
-            </a:ext>
-          </a:extLst>
-        </p:spPr>
-      </p:pic>
-    </p:spTree>
-    <p:extLst>
-      <p:ext uri="{BB962C8B-B14F-4D97-AF65-F5344CB8AC3E}">
-        <p14:creationId xmlns:p14="http://schemas.microsoft.com/office/powerpoint/2010/main" val="3294185420"/>
-      </p:ext>
-    </p:extLst>
-  </p:cSld>
-  <p:clrMapOvr>
-    <a:masterClrMapping/>
-  </p:clrMapOvr>
-</p:sld>
-</file>
-
-<file path=ppt/slides/slide20.xml><?xml version="1.0" encoding="utf-8"?>
+<file path=ppt/slides/slide21.xml><?xml version="1.0" encoding="utf-8"?>
 <p:sld xmlns:a="http://schemas.openxmlformats.org/drawingml/2006/main" xmlns:r="http://schemas.openxmlformats.org/officeDocument/2006/relationships" xmlns:p="http://schemas.openxmlformats.org/presentationml/2006/main">
   <p:cSld>
     <p:spTree>
@@ -12232,7 +12779,7 @@
 </p:sld>
 </file>
 
-<file path=ppt/slides/slide21.xml><?xml version="1.0" encoding="utf-8"?>
+<file path=ppt/slides/slide22.xml><?xml version="1.0" encoding="utf-8"?>
 <p:sld xmlns:a="http://schemas.openxmlformats.org/drawingml/2006/main" xmlns:r="http://schemas.openxmlformats.org/officeDocument/2006/relationships" xmlns:p="http://schemas.openxmlformats.org/presentationml/2006/main">
   <p:cSld>
     <p:spTree>
@@ -13424,7 +13971,7 @@
 </p:sld>
 </file>
 
-<file path=ppt/slides/slide22.xml><?xml version="1.0" encoding="utf-8"?>
+<file path=ppt/slides/slide23.xml><?xml version="1.0" encoding="utf-8"?>
 <p:sld xmlns:a="http://schemas.openxmlformats.org/drawingml/2006/main" xmlns:r="http://schemas.openxmlformats.org/officeDocument/2006/relationships" xmlns:p="http://schemas.openxmlformats.org/presentationml/2006/main">
   <p:cSld>
     <p:spTree>
@@ -13850,7 +14397,7 @@
 </p:sld>
 </file>
 
-<file path=ppt/slides/slide23.xml><?xml version="1.0" encoding="utf-8"?>
+<file path=ppt/slides/slide24.xml><?xml version="1.0" encoding="utf-8"?>
 <p:sld xmlns:a="http://schemas.openxmlformats.org/drawingml/2006/main" xmlns:r="http://schemas.openxmlformats.org/officeDocument/2006/relationships" xmlns:p="http://schemas.openxmlformats.org/presentationml/2006/main">
   <p:cSld>
     <p:spTree>
@@ -15875,7 +16422,7 @@
 </p:sld>
 </file>
 
-<file path=ppt/slides/slide24.xml><?xml version="1.0" encoding="utf-8"?>
+<file path=ppt/slides/slide25.xml><?xml version="1.0" encoding="utf-8"?>
 <p:sld xmlns:a="http://schemas.openxmlformats.org/drawingml/2006/main" xmlns:r="http://schemas.openxmlformats.org/officeDocument/2006/relationships" xmlns:p="http://schemas.openxmlformats.org/presentationml/2006/main">
   <p:cSld>
     <p:spTree>
@@ -16177,7 +16724,7 @@
 </p:sld>
 </file>
 
-<file path=ppt/slides/slide25.xml><?xml version="1.0" encoding="utf-8"?>
+<file path=ppt/slides/slide26.xml><?xml version="1.0" encoding="utf-8"?>
 <p:sld xmlns:a="http://schemas.openxmlformats.org/drawingml/2006/main" xmlns:r="http://schemas.openxmlformats.org/officeDocument/2006/relationships" xmlns:p="http://schemas.openxmlformats.org/presentationml/2006/main">
   <p:cSld>
     <p:spTree>
@@ -16397,7 +16944,7 @@
 </p:sld>
 </file>
 
-<file path=ppt/slides/slide26.xml><?xml version="1.0" encoding="utf-8"?>
+<file path=ppt/slides/slide27.xml><?xml version="1.0" encoding="utf-8"?>
 <p:sld xmlns:a="http://schemas.openxmlformats.org/drawingml/2006/main" xmlns:r="http://schemas.openxmlformats.org/officeDocument/2006/relationships" xmlns:p="http://schemas.openxmlformats.org/presentationml/2006/main">
   <p:cSld>
     <p:spTree>
@@ -16614,7 +17161,7 @@
 </p:sld>
 </file>
 
-<file path=ppt/slides/slide27.xml><?xml version="1.0" encoding="utf-8"?>
+<file path=ppt/slides/slide28.xml><?xml version="1.0" encoding="utf-8"?>
 <p:sld xmlns:a="http://schemas.openxmlformats.org/drawingml/2006/main" xmlns:r="http://schemas.openxmlformats.org/officeDocument/2006/relationships" xmlns:p="http://schemas.openxmlformats.org/presentationml/2006/main">
   <p:cSld>
     <p:spTree>
@@ -16902,7 +17449,7 @@
 </p:sld>
 </file>
 
-<file path=ppt/slides/slide28.xml><?xml version="1.0" encoding="utf-8"?>
+<file path=ppt/slides/slide29.xml><?xml version="1.0" encoding="utf-8"?>
 <p:sld xmlns:a="http://schemas.openxmlformats.org/drawingml/2006/main" xmlns:r="http://schemas.openxmlformats.org/officeDocument/2006/relationships" xmlns:p="http://schemas.openxmlformats.org/presentationml/2006/main">
   <p:cSld>
     <p:spTree>
@@ -17205,254 +17752,6 @@
     <p:extLst>
       <p:ext uri="{BB962C8B-B14F-4D97-AF65-F5344CB8AC3E}">
         <p14:creationId xmlns:p14="http://schemas.microsoft.com/office/powerpoint/2010/main" val="2561346999"/>
-      </p:ext>
-    </p:extLst>
-  </p:cSld>
-  <p:clrMapOvr>
-    <a:masterClrMapping/>
-  </p:clrMapOvr>
-</p:sld>
-</file>
-
-<file path=ppt/slides/slide29.xml><?xml version="1.0" encoding="utf-8"?>
-<p:sld xmlns:a="http://schemas.openxmlformats.org/drawingml/2006/main" xmlns:r="http://schemas.openxmlformats.org/officeDocument/2006/relationships" xmlns:p="http://schemas.openxmlformats.org/presentationml/2006/main">
-  <p:cSld>
-    <p:spTree>
-      <p:nvGrpSpPr>
-        <p:cNvPr id="1" name="">
-          <a:extLst>
-            <a:ext uri="{FF2B5EF4-FFF2-40B4-BE49-F238E27FC236}">
-              <a16:creationId xmlns:a16="http://schemas.microsoft.com/office/drawing/2014/main" id="{40D1F7B6-1897-DD92-565C-A86B25929740}"/>
-            </a:ext>
-          </a:extLst>
-        </p:cNvPr>
-        <p:cNvGrpSpPr/>
-        <p:nvPr/>
-      </p:nvGrpSpPr>
-      <p:grpSpPr>
-        <a:xfrm>
-          <a:off x="0" y="0"/>
-          <a:ext cx="0" cy="0"/>
-          <a:chOff x="0" y="0"/>
-          <a:chExt cx="0" cy="0"/>
-        </a:xfrm>
-      </p:grpSpPr>
-      <p:sp>
-        <p:nvSpPr>
-          <p:cNvPr id="2" name="TextBox 1">
-            <a:extLst>
-              <a:ext uri="{FF2B5EF4-FFF2-40B4-BE49-F238E27FC236}">
-                <a16:creationId xmlns:a16="http://schemas.microsoft.com/office/drawing/2014/main" id="{9773E788-5CBC-B5E5-9688-6CF2839675D0}"/>
-              </a:ext>
-            </a:extLst>
-          </p:cNvPr>
-          <p:cNvSpPr txBox="1"/>
-          <p:nvPr/>
-        </p:nvSpPr>
-        <p:spPr>
-          <a:xfrm>
-            <a:off x="137652" y="48592"/>
-            <a:ext cx="7503977" cy="861774"/>
-          </a:xfrm>
-          <a:prstGeom prst="rect">
-            <a:avLst/>
-          </a:prstGeom>
-          <a:noFill/>
-        </p:spPr>
-        <p:txBody>
-          <a:bodyPr wrap="none" rtlCol="0">
-            <a:spAutoFit/>
-          </a:bodyPr>
-          <a:lstStyle/>
-          <a:p>
-            <a:r>
-              <a:rPr lang="pt-BR" sz="3200" b="1" dirty="0">
-                <a:latin typeface="Nunito Sans Normal" pitchFamily="2" charset="0"/>
-              </a:rPr>
-              <a:t>4. DATA ANALYSIS</a:t>
-            </a:r>
-          </a:p>
-          <a:p>
-            <a:r>
-              <a:rPr lang="pt-BR" dirty="0">
-                <a:latin typeface="Nunito Sans Normal" pitchFamily="2" charset="0"/>
-              </a:rPr>
-              <a:t>4.2 DIFFERENCE BETWEEN VALUEABLE USERS AND OTHER USERS</a:t>
-            </a:r>
-          </a:p>
-        </p:txBody>
-      </p:sp>
-      <p:pic>
-        <p:nvPicPr>
-          <p:cNvPr id="17" name="Picture 2" descr="FabFitFun - Beauty, Fitness, Lifestyle">
-            <a:extLst>
-              <a:ext uri="{FF2B5EF4-FFF2-40B4-BE49-F238E27FC236}">
-                <a16:creationId xmlns:a16="http://schemas.microsoft.com/office/drawing/2014/main" id="{F1B8634D-7BFA-73AD-0AB5-D058E9C0E0A9}"/>
-              </a:ext>
-            </a:extLst>
-          </p:cNvPr>
-          <p:cNvPicPr>
-            <a:picLocks noChangeAspect="1" noChangeArrowheads="1"/>
-          </p:cNvPicPr>
-          <p:nvPr/>
-        </p:nvPicPr>
-        <p:blipFill>
-          <a:blip r:embed="rId3">
-            <a:extLst>
-              <a:ext uri="{28A0092B-C50C-407E-A947-70E740481C1C}">
-                <a14:useLocalDpi xmlns:a14="http://schemas.microsoft.com/office/drawing/2010/main" val="0"/>
-              </a:ext>
-            </a:extLst>
-          </a:blip>
-          <a:srcRect/>
-          <a:stretch>
-            <a:fillRect/>
-          </a:stretch>
-        </p:blipFill>
-        <p:spPr bwMode="auto">
-          <a:xfrm>
-            <a:off x="10053486" y="5886204"/>
-            <a:ext cx="1759973" cy="725989"/>
-          </a:xfrm>
-          <a:prstGeom prst="rect">
-            <a:avLst/>
-          </a:prstGeom>
-          <a:noFill/>
-          <a:extLst>
-            <a:ext uri="{909E8E84-426E-40DD-AFC4-6F175D3DCCD1}">
-              <a14:hiddenFill xmlns:a14="http://schemas.microsoft.com/office/drawing/2010/main">
-                <a:solidFill>
-                  <a:srgbClr val="FFFFFF"/>
-                </a:solidFill>
-              </a14:hiddenFill>
-            </a:ext>
-          </a:extLst>
-        </p:spPr>
-      </p:pic>
-      <p:pic>
-        <p:nvPicPr>
-          <p:cNvPr id="4" name="Picture 3">
-            <a:extLst>
-              <a:ext uri="{FF2B5EF4-FFF2-40B4-BE49-F238E27FC236}">
-                <a16:creationId xmlns:a16="http://schemas.microsoft.com/office/drawing/2014/main" id="{C2E2E44F-D166-0F9E-0DAB-921BDCACD9F8}"/>
-              </a:ext>
-            </a:extLst>
-          </p:cNvPr>
-          <p:cNvPicPr>
-            <a:picLocks noChangeAspect="1"/>
-          </p:cNvPicPr>
-          <p:nvPr/>
-        </p:nvPicPr>
-        <p:blipFill>
-          <a:blip r:embed="rId4"/>
-          <a:stretch>
-            <a:fillRect/>
-          </a:stretch>
-        </p:blipFill>
-        <p:spPr>
-          <a:xfrm>
-            <a:off x="59368" y="2044032"/>
-            <a:ext cx="3738160" cy="2774315"/>
-          </a:xfrm>
-          <a:prstGeom prst="rect">
-            <a:avLst/>
-          </a:prstGeom>
-        </p:spPr>
-      </p:pic>
-      <p:pic>
-        <p:nvPicPr>
-          <p:cNvPr id="1028" name="Picture 4" descr="Imagem carregada">
-            <a:extLst>
-              <a:ext uri="{FF2B5EF4-FFF2-40B4-BE49-F238E27FC236}">
-                <a16:creationId xmlns:a16="http://schemas.microsoft.com/office/drawing/2014/main" id="{54A6AC04-8027-5221-C712-8D75F4489EE4}"/>
-              </a:ext>
-            </a:extLst>
-          </p:cNvPr>
-          <p:cNvPicPr>
-            <a:picLocks noChangeAspect="1" noChangeArrowheads="1"/>
-          </p:cNvPicPr>
-          <p:nvPr/>
-        </p:nvPicPr>
-        <p:blipFill rotWithShape="1">
-          <a:blip r:embed="rId5">
-            <a:extLst>
-              <a:ext uri="{28A0092B-C50C-407E-A947-70E740481C1C}">
-                <a14:useLocalDpi xmlns:a14="http://schemas.microsoft.com/office/drawing/2010/main" val="0"/>
-              </a:ext>
-            </a:extLst>
-          </a:blip>
-          <a:srcRect l="1568" t="2233" r="2409" b="5003"/>
-          <a:stretch/>
-        </p:blipFill>
-        <p:spPr bwMode="auto">
-          <a:xfrm>
-            <a:off x="4184333" y="2128527"/>
-            <a:ext cx="3720593" cy="2774315"/>
-          </a:xfrm>
-          <a:prstGeom prst="rect">
-            <a:avLst/>
-          </a:prstGeom>
-          <a:noFill/>
-          <a:extLst>
-            <a:ext uri="{909E8E84-426E-40DD-AFC4-6F175D3DCCD1}">
-              <a14:hiddenFill xmlns:a14="http://schemas.microsoft.com/office/drawing/2010/main">
-                <a:solidFill>
-                  <a:srgbClr val="FFFFFF"/>
-                </a:solidFill>
-              </a14:hiddenFill>
-            </a:ext>
-          </a:extLst>
-        </p:spPr>
-      </p:pic>
-      <p:pic>
-        <p:nvPicPr>
-          <p:cNvPr id="1030" name="Picture 6" descr="Imagem carregada">
-            <a:extLst>
-              <a:ext uri="{FF2B5EF4-FFF2-40B4-BE49-F238E27FC236}">
-                <a16:creationId xmlns:a16="http://schemas.microsoft.com/office/drawing/2014/main" id="{32AD4479-FCD9-CE1E-AE50-95D1B68B9EA0}"/>
-              </a:ext>
-            </a:extLst>
-          </p:cNvPr>
-          <p:cNvPicPr>
-            <a:picLocks noChangeAspect="1" noChangeArrowheads="1"/>
-          </p:cNvPicPr>
-          <p:nvPr/>
-        </p:nvPicPr>
-        <p:blipFill rotWithShape="1">
-          <a:blip r:embed="rId6">
-            <a:extLst>
-              <a:ext uri="{28A0092B-C50C-407E-A947-70E740481C1C}">
-                <a14:useLocalDpi xmlns:a14="http://schemas.microsoft.com/office/drawing/2010/main" val="0"/>
-              </a:ext>
-            </a:extLst>
-          </a:blip>
-          <a:srcRect r="1373" b="2922"/>
-          <a:stretch/>
-        </p:blipFill>
-        <p:spPr bwMode="auto">
-          <a:xfrm>
-            <a:off x="8024358" y="2044032"/>
-            <a:ext cx="4005534" cy="2943307"/>
-          </a:xfrm>
-          <a:prstGeom prst="rect">
-            <a:avLst/>
-          </a:prstGeom>
-          <a:noFill/>
-          <a:extLst>
-            <a:ext uri="{909E8E84-426E-40DD-AFC4-6F175D3DCCD1}">
-              <a14:hiddenFill xmlns:a14="http://schemas.microsoft.com/office/drawing/2010/main">
-                <a:solidFill>
-                  <a:srgbClr val="FFFFFF"/>
-                </a:solidFill>
-              </a14:hiddenFill>
-            </a:ext>
-          </a:extLst>
-        </p:spPr>
-      </p:pic>
-    </p:spTree>
-    <p:extLst>
-      <p:ext uri="{BB962C8B-B14F-4D97-AF65-F5344CB8AC3E}">
-        <p14:creationId xmlns:p14="http://schemas.microsoft.com/office/powerpoint/2010/main" val="3486114502"/>
       </p:ext>
     </p:extLst>
   </p:cSld>
@@ -17643,6 +17942,254 @@
 </file>
 
 <file path=ppt/slides/slide30.xml><?xml version="1.0" encoding="utf-8"?>
+<p:sld xmlns:a="http://schemas.openxmlformats.org/drawingml/2006/main" xmlns:r="http://schemas.openxmlformats.org/officeDocument/2006/relationships" xmlns:p="http://schemas.openxmlformats.org/presentationml/2006/main">
+  <p:cSld>
+    <p:spTree>
+      <p:nvGrpSpPr>
+        <p:cNvPr id="1" name="">
+          <a:extLst>
+            <a:ext uri="{FF2B5EF4-FFF2-40B4-BE49-F238E27FC236}">
+              <a16:creationId xmlns:a16="http://schemas.microsoft.com/office/drawing/2014/main" id="{40D1F7B6-1897-DD92-565C-A86B25929740}"/>
+            </a:ext>
+          </a:extLst>
+        </p:cNvPr>
+        <p:cNvGrpSpPr/>
+        <p:nvPr/>
+      </p:nvGrpSpPr>
+      <p:grpSpPr>
+        <a:xfrm>
+          <a:off x="0" y="0"/>
+          <a:ext cx="0" cy="0"/>
+          <a:chOff x="0" y="0"/>
+          <a:chExt cx="0" cy="0"/>
+        </a:xfrm>
+      </p:grpSpPr>
+      <p:sp>
+        <p:nvSpPr>
+          <p:cNvPr id="2" name="TextBox 1">
+            <a:extLst>
+              <a:ext uri="{FF2B5EF4-FFF2-40B4-BE49-F238E27FC236}">
+                <a16:creationId xmlns:a16="http://schemas.microsoft.com/office/drawing/2014/main" id="{9773E788-5CBC-B5E5-9688-6CF2839675D0}"/>
+              </a:ext>
+            </a:extLst>
+          </p:cNvPr>
+          <p:cNvSpPr txBox="1"/>
+          <p:nvPr/>
+        </p:nvSpPr>
+        <p:spPr>
+          <a:xfrm>
+            <a:off x="137652" y="48592"/>
+            <a:ext cx="7503977" cy="861774"/>
+          </a:xfrm>
+          <a:prstGeom prst="rect">
+            <a:avLst/>
+          </a:prstGeom>
+          <a:noFill/>
+        </p:spPr>
+        <p:txBody>
+          <a:bodyPr wrap="none" rtlCol="0">
+            <a:spAutoFit/>
+          </a:bodyPr>
+          <a:lstStyle/>
+          <a:p>
+            <a:r>
+              <a:rPr lang="pt-BR" sz="3200" b="1" dirty="0">
+                <a:latin typeface="Nunito Sans Normal" pitchFamily="2" charset="0"/>
+              </a:rPr>
+              <a:t>4. DATA ANALYSIS</a:t>
+            </a:r>
+          </a:p>
+          <a:p>
+            <a:r>
+              <a:rPr lang="pt-BR" dirty="0">
+                <a:latin typeface="Nunito Sans Normal" pitchFamily="2" charset="0"/>
+              </a:rPr>
+              <a:t>4.2 DIFFERENCE BETWEEN VALUEABLE USERS AND OTHER USERS</a:t>
+            </a:r>
+          </a:p>
+        </p:txBody>
+      </p:sp>
+      <p:pic>
+        <p:nvPicPr>
+          <p:cNvPr id="17" name="Picture 2" descr="FabFitFun - Beauty, Fitness, Lifestyle">
+            <a:extLst>
+              <a:ext uri="{FF2B5EF4-FFF2-40B4-BE49-F238E27FC236}">
+                <a16:creationId xmlns:a16="http://schemas.microsoft.com/office/drawing/2014/main" id="{F1B8634D-7BFA-73AD-0AB5-D058E9C0E0A9}"/>
+              </a:ext>
+            </a:extLst>
+          </p:cNvPr>
+          <p:cNvPicPr>
+            <a:picLocks noChangeAspect="1" noChangeArrowheads="1"/>
+          </p:cNvPicPr>
+          <p:nvPr/>
+        </p:nvPicPr>
+        <p:blipFill>
+          <a:blip r:embed="rId3">
+            <a:extLst>
+              <a:ext uri="{28A0092B-C50C-407E-A947-70E740481C1C}">
+                <a14:useLocalDpi xmlns:a14="http://schemas.microsoft.com/office/drawing/2010/main" val="0"/>
+              </a:ext>
+            </a:extLst>
+          </a:blip>
+          <a:srcRect/>
+          <a:stretch>
+            <a:fillRect/>
+          </a:stretch>
+        </p:blipFill>
+        <p:spPr bwMode="auto">
+          <a:xfrm>
+            <a:off x="10053486" y="5886204"/>
+            <a:ext cx="1759973" cy="725989"/>
+          </a:xfrm>
+          <a:prstGeom prst="rect">
+            <a:avLst/>
+          </a:prstGeom>
+          <a:noFill/>
+          <a:extLst>
+            <a:ext uri="{909E8E84-426E-40DD-AFC4-6F175D3DCCD1}">
+              <a14:hiddenFill xmlns:a14="http://schemas.microsoft.com/office/drawing/2010/main">
+                <a:solidFill>
+                  <a:srgbClr val="FFFFFF"/>
+                </a:solidFill>
+              </a14:hiddenFill>
+            </a:ext>
+          </a:extLst>
+        </p:spPr>
+      </p:pic>
+      <p:pic>
+        <p:nvPicPr>
+          <p:cNvPr id="4" name="Picture 3">
+            <a:extLst>
+              <a:ext uri="{FF2B5EF4-FFF2-40B4-BE49-F238E27FC236}">
+                <a16:creationId xmlns:a16="http://schemas.microsoft.com/office/drawing/2014/main" id="{C2E2E44F-D166-0F9E-0DAB-921BDCACD9F8}"/>
+              </a:ext>
+            </a:extLst>
+          </p:cNvPr>
+          <p:cNvPicPr>
+            <a:picLocks noChangeAspect="1"/>
+          </p:cNvPicPr>
+          <p:nvPr/>
+        </p:nvPicPr>
+        <p:blipFill>
+          <a:blip r:embed="rId4"/>
+          <a:stretch>
+            <a:fillRect/>
+          </a:stretch>
+        </p:blipFill>
+        <p:spPr>
+          <a:xfrm>
+            <a:off x="59368" y="2044032"/>
+            <a:ext cx="3738160" cy="2774315"/>
+          </a:xfrm>
+          <a:prstGeom prst="rect">
+            <a:avLst/>
+          </a:prstGeom>
+        </p:spPr>
+      </p:pic>
+      <p:pic>
+        <p:nvPicPr>
+          <p:cNvPr id="1028" name="Picture 4" descr="Imagem carregada">
+            <a:extLst>
+              <a:ext uri="{FF2B5EF4-FFF2-40B4-BE49-F238E27FC236}">
+                <a16:creationId xmlns:a16="http://schemas.microsoft.com/office/drawing/2014/main" id="{54A6AC04-8027-5221-C712-8D75F4489EE4}"/>
+              </a:ext>
+            </a:extLst>
+          </p:cNvPr>
+          <p:cNvPicPr>
+            <a:picLocks noChangeAspect="1" noChangeArrowheads="1"/>
+          </p:cNvPicPr>
+          <p:nvPr/>
+        </p:nvPicPr>
+        <p:blipFill rotWithShape="1">
+          <a:blip r:embed="rId5">
+            <a:extLst>
+              <a:ext uri="{28A0092B-C50C-407E-A947-70E740481C1C}">
+                <a14:useLocalDpi xmlns:a14="http://schemas.microsoft.com/office/drawing/2010/main" val="0"/>
+              </a:ext>
+            </a:extLst>
+          </a:blip>
+          <a:srcRect l="1568" t="2233" r="2409" b="5003"/>
+          <a:stretch/>
+        </p:blipFill>
+        <p:spPr bwMode="auto">
+          <a:xfrm>
+            <a:off x="4184333" y="2128527"/>
+            <a:ext cx="3720593" cy="2774315"/>
+          </a:xfrm>
+          <a:prstGeom prst="rect">
+            <a:avLst/>
+          </a:prstGeom>
+          <a:noFill/>
+          <a:extLst>
+            <a:ext uri="{909E8E84-426E-40DD-AFC4-6F175D3DCCD1}">
+              <a14:hiddenFill xmlns:a14="http://schemas.microsoft.com/office/drawing/2010/main">
+                <a:solidFill>
+                  <a:srgbClr val="FFFFFF"/>
+                </a:solidFill>
+              </a14:hiddenFill>
+            </a:ext>
+          </a:extLst>
+        </p:spPr>
+      </p:pic>
+      <p:pic>
+        <p:nvPicPr>
+          <p:cNvPr id="1030" name="Picture 6" descr="Imagem carregada">
+            <a:extLst>
+              <a:ext uri="{FF2B5EF4-FFF2-40B4-BE49-F238E27FC236}">
+                <a16:creationId xmlns:a16="http://schemas.microsoft.com/office/drawing/2014/main" id="{32AD4479-FCD9-CE1E-AE50-95D1B68B9EA0}"/>
+              </a:ext>
+            </a:extLst>
+          </p:cNvPr>
+          <p:cNvPicPr>
+            <a:picLocks noChangeAspect="1" noChangeArrowheads="1"/>
+          </p:cNvPicPr>
+          <p:nvPr/>
+        </p:nvPicPr>
+        <p:blipFill rotWithShape="1">
+          <a:blip r:embed="rId6">
+            <a:extLst>
+              <a:ext uri="{28A0092B-C50C-407E-A947-70E740481C1C}">
+                <a14:useLocalDpi xmlns:a14="http://schemas.microsoft.com/office/drawing/2010/main" val="0"/>
+              </a:ext>
+            </a:extLst>
+          </a:blip>
+          <a:srcRect r="1373" b="2922"/>
+          <a:stretch/>
+        </p:blipFill>
+        <p:spPr bwMode="auto">
+          <a:xfrm>
+            <a:off x="8024358" y="2044032"/>
+            <a:ext cx="4005534" cy="2943307"/>
+          </a:xfrm>
+          <a:prstGeom prst="rect">
+            <a:avLst/>
+          </a:prstGeom>
+          <a:noFill/>
+          <a:extLst>
+            <a:ext uri="{909E8E84-426E-40DD-AFC4-6F175D3DCCD1}">
+              <a14:hiddenFill xmlns:a14="http://schemas.microsoft.com/office/drawing/2010/main">
+                <a:solidFill>
+                  <a:srgbClr val="FFFFFF"/>
+                </a:solidFill>
+              </a14:hiddenFill>
+            </a:ext>
+          </a:extLst>
+        </p:spPr>
+      </p:pic>
+    </p:spTree>
+    <p:extLst>
+      <p:ext uri="{BB962C8B-B14F-4D97-AF65-F5344CB8AC3E}">
+        <p14:creationId xmlns:p14="http://schemas.microsoft.com/office/powerpoint/2010/main" val="3486114502"/>
+      </p:ext>
+    </p:extLst>
+  </p:cSld>
+  <p:clrMapOvr>
+    <a:masterClrMapping/>
+  </p:clrMapOvr>
+</p:sld>
+</file>
+
+<file path=ppt/slides/slide31.xml><?xml version="1.0" encoding="utf-8"?>
 <p:sld xmlns:a="http://schemas.openxmlformats.org/drawingml/2006/main" xmlns:r="http://schemas.openxmlformats.org/officeDocument/2006/relationships" xmlns:p="http://schemas.openxmlformats.org/presentationml/2006/main">
   <p:cSld>
     <p:spTree>
@@ -18705,7 +19252,7 @@
 </p:sld>
 </file>
 
-<file path=ppt/slides/slide31.xml><?xml version="1.0" encoding="utf-8"?>
+<file path=ppt/slides/slide32.xml><?xml version="1.0" encoding="utf-8"?>
 <p:sld xmlns:a="http://schemas.openxmlformats.org/drawingml/2006/main" xmlns:r="http://schemas.openxmlformats.org/officeDocument/2006/relationships" xmlns:p="http://schemas.openxmlformats.org/presentationml/2006/main">
   <p:cSld>
     <p:spTree>
@@ -18743,7 +19290,7 @@
         <p:spPr>
           <a:xfrm>
             <a:off x="137652" y="48592"/>
-            <a:ext cx="3836307" cy="861774"/>
+            <a:ext cx="4645824" cy="861774"/>
           </a:xfrm>
           <a:prstGeom prst="rect">
             <a:avLst/>
@@ -18768,7 +19315,7 @@
               <a:rPr lang="pt-BR" dirty="0">
                 <a:latin typeface="Nunito Sans Normal" pitchFamily="2" charset="0"/>
               </a:rPr>
-              <a:t>4.2 CHANNELS</a:t>
+              <a:t>4.2 CHANNELS – USING ONLY LAST VISIT</a:t>
             </a:r>
           </a:p>
         </p:txBody>
@@ -18820,55 +19367,12 @@
           </a:extLst>
         </p:spPr>
       </p:pic>
-      <p:sp>
-        <p:nvSpPr>
-          <p:cNvPr id="20" name="TextBox 19">
-            <a:extLst>
-              <a:ext uri="{FF2B5EF4-FFF2-40B4-BE49-F238E27FC236}">
-                <a16:creationId xmlns:a16="http://schemas.microsoft.com/office/drawing/2014/main" id="{60C4F5DC-BF32-118E-7620-FB427CAF06D3}"/>
-              </a:ext>
-            </a:extLst>
-          </p:cNvPr>
-          <p:cNvSpPr txBox="1"/>
-          <p:nvPr/>
-        </p:nvSpPr>
-        <p:spPr>
-          <a:xfrm>
-            <a:off x="1568532" y="5055207"/>
-            <a:ext cx="7901732" cy="830997"/>
-          </a:xfrm>
-          <a:prstGeom prst="rect">
-            <a:avLst/>
-          </a:prstGeom>
-          <a:noFill/>
-        </p:spPr>
-        <p:txBody>
-          <a:bodyPr wrap="square">
-            <a:spAutoFit/>
-          </a:bodyPr>
-          <a:lstStyle/>
-          <a:p>
-            <a:r>
-              <a:rPr lang="pt-BR" sz="2400" b="1" dirty="0">
-                <a:latin typeface="Nunito Sans Normal" pitchFamily="2" charset="0"/>
-              </a:rPr>
-              <a:t>The channel that best drives these members to sales is</a:t>
-            </a:r>
-            <a:r>
-              <a:rPr lang="pt-BR" sz="2400" dirty="0">
-                <a:latin typeface="Nunito Sans Normal" pitchFamily="2" charset="0"/>
-              </a:rPr>
-              <a:t> Mobile IOS in all months.</a:t>
-            </a:r>
-          </a:p>
-        </p:txBody>
-      </p:sp>
       <p:pic>
         <p:nvPicPr>
-          <p:cNvPr id="21" name="Graphic 20" descr="Lights On with solid fill">
-            <a:extLst>
-              <a:ext uri="{FF2B5EF4-FFF2-40B4-BE49-F238E27FC236}">
-                <a16:creationId xmlns:a16="http://schemas.microsoft.com/office/drawing/2014/main" id="{902872B3-81F7-F720-E9BE-6FCE2246462A}"/>
+          <p:cNvPr id="5" name="Picture 4">
+            <a:extLst>
+              <a:ext uri="{FF2B5EF4-FFF2-40B4-BE49-F238E27FC236}">
+                <a16:creationId xmlns:a16="http://schemas.microsoft.com/office/drawing/2014/main" id="{343B5172-AF63-D1F6-A931-89F7B051D76C}"/>
               </a:ext>
             </a:extLst>
           </p:cNvPr>
@@ -18878,89 +19382,15 @@
           <p:nvPr/>
         </p:nvPicPr>
         <p:blipFill>
-          <a:blip r:embed="rId4">
-            <a:extLst>
-              <a:ext uri="{96DAC541-7B7A-43D3-8B79-37D633B846F1}">
-                <asvg:svgBlip xmlns:asvg="http://schemas.microsoft.com/office/drawing/2016/SVG/main" r:embed="rId5"/>
-              </a:ext>
-            </a:extLst>
-          </a:blip>
+          <a:blip r:embed="rId4"/>
           <a:stretch>
             <a:fillRect/>
           </a:stretch>
         </p:blipFill>
         <p:spPr>
           <a:xfrm>
-            <a:off x="229113" y="4591579"/>
-            <a:ext cx="1443992" cy="1443992"/>
-          </a:xfrm>
-          <a:prstGeom prst="rect">
-            <a:avLst/>
-          </a:prstGeom>
-        </p:spPr>
-      </p:pic>
-      <p:sp>
-        <p:nvSpPr>
-          <p:cNvPr id="7" name="TextBox 6">
-            <a:extLst>
-              <a:ext uri="{FF2B5EF4-FFF2-40B4-BE49-F238E27FC236}">
-                <a16:creationId xmlns:a16="http://schemas.microsoft.com/office/drawing/2014/main" id="{8E779B27-A6C7-BF38-5C05-2AACDED42CF3}"/>
-              </a:ext>
-            </a:extLst>
-          </p:cNvPr>
-          <p:cNvSpPr txBox="1"/>
-          <p:nvPr/>
-        </p:nvSpPr>
-        <p:spPr>
-          <a:xfrm>
-            <a:off x="378541" y="6095309"/>
-            <a:ext cx="8888729" cy="523220"/>
-          </a:xfrm>
-          <a:prstGeom prst="rect">
-            <a:avLst/>
-          </a:prstGeom>
-          <a:noFill/>
-        </p:spPr>
-        <p:txBody>
-          <a:bodyPr wrap="square">
-            <a:spAutoFit/>
-          </a:bodyPr>
-          <a:lstStyle/>
-          <a:p>
-            <a:r>
-              <a:rPr lang="pt-BR" sz="1400" dirty="0">
-                <a:latin typeface="Nunito Sans Normal" pitchFamily="2" charset="0"/>
-              </a:rPr>
-              <a:t>* Considering time window of 1 year, same users and that the sum of visit cnt that has the same channel for each user + campaign.</a:t>
-            </a:r>
-            <a:endParaRPr lang="pt-BR" sz="1400" dirty="0"/>
-          </a:p>
-        </p:txBody>
-      </p:sp>
-      <p:pic>
-        <p:nvPicPr>
-          <p:cNvPr id="4" name="Picture 3">
-            <a:extLst>
-              <a:ext uri="{FF2B5EF4-FFF2-40B4-BE49-F238E27FC236}">
-                <a16:creationId xmlns:a16="http://schemas.microsoft.com/office/drawing/2014/main" id="{10955B67-8819-8BC7-AB8E-12C59C42C32C}"/>
-              </a:ext>
-            </a:extLst>
-          </p:cNvPr>
-          <p:cNvPicPr>
-            <a:picLocks noChangeAspect="1"/>
-          </p:cNvPicPr>
-          <p:nvPr/>
-        </p:nvPicPr>
-        <p:blipFill>
-          <a:blip r:embed="rId6"/>
-          <a:stretch>
-            <a:fillRect/>
-          </a:stretch>
-        </p:blipFill>
-        <p:spPr>
-          <a:xfrm>
-            <a:off x="1568532" y="1158507"/>
-            <a:ext cx="9206774" cy="3856623"/>
+            <a:off x="889323" y="1513497"/>
+            <a:ext cx="10413354" cy="4372707"/>
           </a:xfrm>
           <a:prstGeom prst="rect">
             <a:avLst/>
@@ -18980,7 +19410,410 @@
 </p:sld>
 </file>
 
-<file path=ppt/slides/slide32.xml><?xml version="1.0" encoding="utf-8"?>
+<file path=ppt/slides/slide33.xml><?xml version="1.0" encoding="utf-8"?>
+<p:sld xmlns:a="http://schemas.openxmlformats.org/drawingml/2006/main" xmlns:r="http://schemas.openxmlformats.org/officeDocument/2006/relationships" xmlns:p="http://schemas.openxmlformats.org/presentationml/2006/main">
+  <p:cSld>
+    <p:spTree>
+      <p:nvGrpSpPr>
+        <p:cNvPr id="1" name="">
+          <a:extLst>
+            <a:ext uri="{FF2B5EF4-FFF2-40B4-BE49-F238E27FC236}">
+              <a16:creationId xmlns:a16="http://schemas.microsoft.com/office/drawing/2014/main" id="{726E5E97-8265-49E2-7C66-D9D28F1F1568}"/>
+            </a:ext>
+          </a:extLst>
+        </p:cNvPr>
+        <p:cNvGrpSpPr/>
+        <p:nvPr/>
+      </p:nvGrpSpPr>
+      <p:grpSpPr>
+        <a:xfrm>
+          <a:off x="0" y="0"/>
+          <a:ext cx="0" cy="0"/>
+          <a:chOff x="0" y="0"/>
+          <a:chExt cx="0" cy="0"/>
+        </a:xfrm>
+      </p:grpSpPr>
+      <p:sp>
+        <p:nvSpPr>
+          <p:cNvPr id="2" name="TextBox 1">
+            <a:extLst>
+              <a:ext uri="{FF2B5EF4-FFF2-40B4-BE49-F238E27FC236}">
+                <a16:creationId xmlns:a16="http://schemas.microsoft.com/office/drawing/2014/main" id="{332E2937-90E9-4881-6683-19FE23EEBDB9}"/>
+              </a:ext>
+            </a:extLst>
+          </p:cNvPr>
+          <p:cNvSpPr txBox="1"/>
+          <p:nvPr/>
+        </p:nvSpPr>
+        <p:spPr>
+          <a:xfrm>
+            <a:off x="137652" y="48592"/>
+            <a:ext cx="9018816" cy="861774"/>
+          </a:xfrm>
+          <a:prstGeom prst="rect">
+            <a:avLst/>
+          </a:prstGeom>
+          <a:noFill/>
+        </p:spPr>
+        <p:txBody>
+          <a:bodyPr wrap="none" rtlCol="0">
+            <a:spAutoFit/>
+          </a:bodyPr>
+          <a:lstStyle/>
+          <a:p>
+            <a:r>
+              <a:rPr lang="pt-BR" sz="3200" b="1" dirty="0">
+                <a:latin typeface="Nunito Sans Normal" pitchFamily="2" charset="0"/>
+              </a:rPr>
+              <a:t>4. DATA ANALYSIS</a:t>
+            </a:r>
+          </a:p>
+          <a:p>
+            <a:r>
+              <a:rPr lang="pt-BR" dirty="0">
+                <a:latin typeface="Nunito Sans Normal" pitchFamily="2" charset="0"/>
+              </a:rPr>
+              <a:t>4.2 CHANNELS – USING LAST VISIT + EQUAL CHANNELS PREVIOUSLY ACCESSED</a:t>
+            </a:r>
+          </a:p>
+        </p:txBody>
+      </p:sp>
+      <p:pic>
+        <p:nvPicPr>
+          <p:cNvPr id="8" name="Picture 2" descr="FabFitFun - Beauty, Fitness, Lifestyle">
+            <a:extLst>
+              <a:ext uri="{FF2B5EF4-FFF2-40B4-BE49-F238E27FC236}">
+                <a16:creationId xmlns:a16="http://schemas.microsoft.com/office/drawing/2014/main" id="{CDC0EFD5-45CA-0BEF-70C4-0C5C9B184211}"/>
+              </a:ext>
+            </a:extLst>
+          </p:cNvPr>
+          <p:cNvPicPr>
+            <a:picLocks noChangeAspect="1" noChangeArrowheads="1"/>
+          </p:cNvPicPr>
+          <p:nvPr/>
+        </p:nvPicPr>
+        <p:blipFill>
+          <a:blip r:embed="rId3">
+            <a:extLst>
+              <a:ext uri="{28A0092B-C50C-407E-A947-70E740481C1C}">
+                <a14:useLocalDpi xmlns:a14="http://schemas.microsoft.com/office/drawing/2010/main" val="0"/>
+              </a:ext>
+            </a:extLst>
+          </a:blip>
+          <a:srcRect/>
+          <a:stretch>
+            <a:fillRect/>
+          </a:stretch>
+        </p:blipFill>
+        <p:spPr bwMode="auto">
+          <a:xfrm>
+            <a:off x="10053486" y="5886204"/>
+            <a:ext cx="1759973" cy="725989"/>
+          </a:xfrm>
+          <a:prstGeom prst="rect">
+            <a:avLst/>
+          </a:prstGeom>
+          <a:noFill/>
+          <a:extLst>
+            <a:ext uri="{909E8E84-426E-40DD-AFC4-6F175D3DCCD1}">
+              <a14:hiddenFill xmlns:a14="http://schemas.microsoft.com/office/drawing/2010/main">
+                <a:solidFill>
+                  <a:srgbClr val="FFFFFF"/>
+                </a:solidFill>
+              </a14:hiddenFill>
+            </a:ext>
+          </a:extLst>
+        </p:spPr>
+      </p:pic>
+      <p:pic>
+        <p:nvPicPr>
+          <p:cNvPr id="4" name="Picture 3">
+            <a:extLst>
+              <a:ext uri="{FF2B5EF4-FFF2-40B4-BE49-F238E27FC236}">
+                <a16:creationId xmlns:a16="http://schemas.microsoft.com/office/drawing/2014/main" id="{F7CEFB6C-8FA8-A555-9BF3-821E9A773B22}"/>
+              </a:ext>
+            </a:extLst>
+          </p:cNvPr>
+          <p:cNvPicPr>
+            <a:picLocks noChangeAspect="1"/>
+          </p:cNvPicPr>
+          <p:nvPr/>
+        </p:nvPicPr>
+        <p:blipFill>
+          <a:blip r:embed="rId4"/>
+          <a:stretch>
+            <a:fillRect/>
+          </a:stretch>
+        </p:blipFill>
+        <p:spPr>
+          <a:xfrm>
+            <a:off x="1146392" y="1369523"/>
+            <a:ext cx="10555709" cy="4421678"/>
+          </a:xfrm>
+          <a:prstGeom prst="rect">
+            <a:avLst/>
+          </a:prstGeom>
+        </p:spPr>
+      </p:pic>
+    </p:spTree>
+    <p:extLst>
+      <p:ext uri="{BB962C8B-B14F-4D97-AF65-F5344CB8AC3E}">
+        <p14:creationId xmlns:p14="http://schemas.microsoft.com/office/powerpoint/2010/main" val="3681900046"/>
+      </p:ext>
+    </p:extLst>
+  </p:cSld>
+  <p:clrMapOvr>
+    <a:masterClrMapping/>
+  </p:clrMapOvr>
+</p:sld>
+</file>
+
+<file path=ppt/slides/slide34.xml><?xml version="1.0" encoding="utf-8"?>
+<p:sld xmlns:a="http://schemas.openxmlformats.org/drawingml/2006/main" xmlns:r="http://schemas.openxmlformats.org/officeDocument/2006/relationships" xmlns:p="http://schemas.openxmlformats.org/presentationml/2006/main">
+  <p:cSld>
+    <p:spTree>
+      <p:nvGrpSpPr>
+        <p:cNvPr id="1" name="">
+          <a:extLst>
+            <a:ext uri="{FF2B5EF4-FFF2-40B4-BE49-F238E27FC236}">
+              <a16:creationId xmlns:a16="http://schemas.microsoft.com/office/drawing/2014/main" id="{98830181-E27F-3CF3-A5BF-83FD6FF8B100}"/>
+            </a:ext>
+          </a:extLst>
+        </p:cNvPr>
+        <p:cNvGrpSpPr/>
+        <p:nvPr/>
+      </p:nvGrpSpPr>
+      <p:grpSpPr>
+        <a:xfrm>
+          <a:off x="0" y="0"/>
+          <a:ext cx="0" cy="0"/>
+          <a:chOff x="0" y="0"/>
+          <a:chExt cx="0" cy="0"/>
+        </a:xfrm>
+      </p:grpSpPr>
+      <p:sp>
+        <p:nvSpPr>
+          <p:cNvPr id="2" name="TextBox 1">
+            <a:extLst>
+              <a:ext uri="{FF2B5EF4-FFF2-40B4-BE49-F238E27FC236}">
+                <a16:creationId xmlns:a16="http://schemas.microsoft.com/office/drawing/2014/main" id="{CCB35615-CE69-FA24-299D-59973E6121ED}"/>
+              </a:ext>
+            </a:extLst>
+          </p:cNvPr>
+          <p:cNvSpPr txBox="1"/>
+          <p:nvPr/>
+        </p:nvSpPr>
+        <p:spPr>
+          <a:xfrm>
+            <a:off x="137652" y="48592"/>
+            <a:ext cx="3836307" cy="861774"/>
+          </a:xfrm>
+          <a:prstGeom prst="rect">
+            <a:avLst/>
+          </a:prstGeom>
+          <a:noFill/>
+        </p:spPr>
+        <p:txBody>
+          <a:bodyPr wrap="none" rtlCol="0">
+            <a:spAutoFit/>
+          </a:bodyPr>
+          <a:lstStyle/>
+          <a:p>
+            <a:r>
+              <a:rPr lang="pt-BR" sz="3200" b="1" dirty="0">
+                <a:latin typeface="Nunito Sans Normal" pitchFamily="2" charset="0"/>
+              </a:rPr>
+              <a:t>4. DATA ANALYSIS</a:t>
+            </a:r>
+          </a:p>
+          <a:p>
+            <a:r>
+              <a:rPr lang="pt-BR" dirty="0">
+                <a:latin typeface="Nunito Sans Normal" pitchFamily="2" charset="0"/>
+              </a:rPr>
+              <a:t>4.2 CHANNELS</a:t>
+            </a:r>
+          </a:p>
+        </p:txBody>
+      </p:sp>
+      <p:pic>
+        <p:nvPicPr>
+          <p:cNvPr id="8" name="Picture 2" descr="FabFitFun - Beauty, Fitness, Lifestyle">
+            <a:extLst>
+              <a:ext uri="{FF2B5EF4-FFF2-40B4-BE49-F238E27FC236}">
+                <a16:creationId xmlns:a16="http://schemas.microsoft.com/office/drawing/2014/main" id="{DA0A8C81-392D-B006-4205-E70F2E28ED60}"/>
+              </a:ext>
+            </a:extLst>
+          </p:cNvPr>
+          <p:cNvPicPr>
+            <a:picLocks noChangeAspect="1" noChangeArrowheads="1"/>
+          </p:cNvPicPr>
+          <p:nvPr/>
+        </p:nvPicPr>
+        <p:blipFill>
+          <a:blip r:embed="rId3">
+            <a:extLst>
+              <a:ext uri="{28A0092B-C50C-407E-A947-70E740481C1C}">
+                <a14:useLocalDpi xmlns:a14="http://schemas.microsoft.com/office/drawing/2010/main" val="0"/>
+              </a:ext>
+            </a:extLst>
+          </a:blip>
+          <a:srcRect/>
+          <a:stretch>
+            <a:fillRect/>
+          </a:stretch>
+        </p:blipFill>
+        <p:spPr bwMode="auto">
+          <a:xfrm>
+            <a:off x="10053486" y="5886204"/>
+            <a:ext cx="1759973" cy="725989"/>
+          </a:xfrm>
+          <a:prstGeom prst="rect">
+            <a:avLst/>
+          </a:prstGeom>
+          <a:noFill/>
+          <a:extLst>
+            <a:ext uri="{909E8E84-426E-40DD-AFC4-6F175D3DCCD1}">
+              <a14:hiddenFill xmlns:a14="http://schemas.microsoft.com/office/drawing/2010/main">
+                <a:solidFill>
+                  <a:srgbClr val="FFFFFF"/>
+                </a:solidFill>
+              </a14:hiddenFill>
+            </a:ext>
+          </a:extLst>
+        </p:spPr>
+      </p:pic>
+      <p:sp>
+        <p:nvSpPr>
+          <p:cNvPr id="20" name="TextBox 19">
+            <a:extLst>
+              <a:ext uri="{FF2B5EF4-FFF2-40B4-BE49-F238E27FC236}">
+                <a16:creationId xmlns:a16="http://schemas.microsoft.com/office/drawing/2014/main" id="{512D6076-F6FD-C58B-B57F-0301C69CAC66}"/>
+              </a:ext>
+            </a:extLst>
+          </p:cNvPr>
+          <p:cNvSpPr txBox="1"/>
+          <p:nvPr/>
+        </p:nvSpPr>
+        <p:spPr>
+          <a:xfrm>
+            <a:off x="2963578" y="2598003"/>
+            <a:ext cx="7901732" cy="830997"/>
+          </a:xfrm>
+          <a:prstGeom prst="rect">
+            <a:avLst/>
+          </a:prstGeom>
+          <a:noFill/>
+        </p:spPr>
+        <p:txBody>
+          <a:bodyPr wrap="square">
+            <a:spAutoFit/>
+          </a:bodyPr>
+          <a:lstStyle/>
+          <a:p>
+            <a:r>
+              <a:rPr lang="pt-BR" sz="2400" b="1" dirty="0">
+                <a:latin typeface="Nunito Sans Normal" pitchFamily="2" charset="0"/>
+              </a:rPr>
+              <a:t>The channel that best drives these members to sales is</a:t>
+            </a:r>
+            <a:r>
+              <a:rPr lang="pt-BR" sz="2400" dirty="0">
+                <a:latin typeface="Nunito Sans Normal" pitchFamily="2" charset="0"/>
+              </a:rPr>
+              <a:t> Mobile IOS in all months.</a:t>
+            </a:r>
+          </a:p>
+        </p:txBody>
+      </p:sp>
+      <p:pic>
+        <p:nvPicPr>
+          <p:cNvPr id="21" name="Graphic 20" descr="Lights On with solid fill">
+            <a:extLst>
+              <a:ext uri="{FF2B5EF4-FFF2-40B4-BE49-F238E27FC236}">
+                <a16:creationId xmlns:a16="http://schemas.microsoft.com/office/drawing/2014/main" id="{FFC0AC62-4A9E-FBA2-C15D-347D00980240}"/>
+              </a:ext>
+            </a:extLst>
+          </p:cNvPr>
+          <p:cNvPicPr>
+            <a:picLocks noChangeAspect="1"/>
+          </p:cNvPicPr>
+          <p:nvPr/>
+        </p:nvPicPr>
+        <p:blipFill>
+          <a:blip r:embed="rId4">
+            <a:extLst>
+              <a:ext uri="{96DAC541-7B7A-43D3-8B79-37D633B846F1}">
+                <asvg:svgBlip xmlns:asvg="http://schemas.microsoft.com/office/drawing/2016/SVG/main" r:embed="rId5"/>
+              </a:ext>
+            </a:extLst>
+          </a:blip>
+          <a:stretch>
+            <a:fillRect/>
+          </a:stretch>
+        </p:blipFill>
+        <p:spPr>
+          <a:xfrm>
+            <a:off x="1624159" y="2320214"/>
+            <a:ext cx="1187581" cy="1187581"/>
+          </a:xfrm>
+          <a:prstGeom prst="rect">
+            <a:avLst/>
+          </a:prstGeom>
+        </p:spPr>
+      </p:pic>
+      <p:sp>
+        <p:nvSpPr>
+          <p:cNvPr id="7" name="TextBox 6">
+            <a:extLst>
+              <a:ext uri="{FF2B5EF4-FFF2-40B4-BE49-F238E27FC236}">
+                <a16:creationId xmlns:a16="http://schemas.microsoft.com/office/drawing/2014/main" id="{591CE59B-B709-C13F-E52D-4E10952562BF}"/>
+              </a:ext>
+            </a:extLst>
+          </p:cNvPr>
+          <p:cNvSpPr txBox="1"/>
+          <p:nvPr/>
+        </p:nvSpPr>
+        <p:spPr>
+          <a:xfrm>
+            <a:off x="1773587" y="3638105"/>
+            <a:ext cx="8888729" cy="523220"/>
+          </a:xfrm>
+          <a:prstGeom prst="rect">
+            <a:avLst/>
+          </a:prstGeom>
+          <a:noFill/>
+        </p:spPr>
+        <p:txBody>
+          <a:bodyPr wrap="square">
+            <a:spAutoFit/>
+          </a:bodyPr>
+          <a:lstStyle/>
+          <a:p>
+            <a:r>
+              <a:rPr lang="pt-BR" sz="1400" dirty="0">
+                <a:latin typeface="Nunito Sans Normal" pitchFamily="2" charset="0"/>
+              </a:rPr>
+              <a:t>* Considering time window of 1 year, same users and that the sum of visit cnt that has the same channel for each user + campaign.</a:t>
+            </a:r>
+            <a:endParaRPr lang="pt-BR" sz="1400" dirty="0"/>
+          </a:p>
+        </p:txBody>
+      </p:sp>
+    </p:spTree>
+    <p:extLst>
+      <p:ext uri="{BB962C8B-B14F-4D97-AF65-F5344CB8AC3E}">
+        <p14:creationId xmlns:p14="http://schemas.microsoft.com/office/powerpoint/2010/main" val="3757287654"/>
+      </p:ext>
+    </p:extLst>
+  </p:cSld>
+  <p:clrMapOvr>
+    <a:masterClrMapping/>
+  </p:clrMapOvr>
+</p:sld>
+</file>
+
+<file path=ppt/slides/slide35.xml><?xml version="1.0" encoding="utf-8"?>
 <p:sld xmlns:a="http://schemas.openxmlformats.org/drawingml/2006/main" xmlns:r="http://schemas.openxmlformats.org/officeDocument/2006/relationships" xmlns:p="http://schemas.openxmlformats.org/presentationml/2006/main">
   <p:cSld>
     <p:spTree>
@@ -19149,120 +19982,6 @@
       </p:pic>
       <p:sp>
         <p:nvSpPr>
-          <p:cNvPr id="11" name="TextBox 10">
-            <a:extLst>
-              <a:ext uri="{FF2B5EF4-FFF2-40B4-BE49-F238E27FC236}">
-                <a16:creationId xmlns:a16="http://schemas.microsoft.com/office/drawing/2014/main" id="{42F0C1A3-DF4F-95E7-3D50-74093F9E6D61}"/>
-              </a:ext>
-            </a:extLst>
-          </p:cNvPr>
-          <p:cNvSpPr txBox="1"/>
-          <p:nvPr/>
-        </p:nvSpPr>
-        <p:spPr>
-          <a:xfrm>
-            <a:off x="8951190" y="1282082"/>
-            <a:ext cx="2924200" cy="523220"/>
-          </a:xfrm>
-          <a:prstGeom prst="rect">
-            <a:avLst/>
-          </a:prstGeom>
-          <a:noFill/>
-        </p:spPr>
-        <p:txBody>
-          <a:bodyPr wrap="square">
-            <a:spAutoFit/>
-          </a:bodyPr>
-          <a:lstStyle/>
-          <a:p>
-            <a:pPr algn="ctr"/>
-            <a:r>
-              <a:rPr lang="pt-BR" sz="2800" b="1" dirty="0">
-                <a:latin typeface="Nunito Sans Normal" pitchFamily="2" charset="0"/>
-              </a:rPr>
-              <a:t>INSIGHTS</a:t>
-            </a:r>
-          </a:p>
-        </p:txBody>
-      </p:sp>
-      <p:sp>
-        <p:nvSpPr>
-          <p:cNvPr id="13" name="TextBox 12">
-            <a:extLst>
-              <a:ext uri="{FF2B5EF4-FFF2-40B4-BE49-F238E27FC236}">
-                <a16:creationId xmlns:a16="http://schemas.microsoft.com/office/drawing/2014/main" id="{42D544F4-29BD-593B-DD28-3924B7F814DE}"/>
-              </a:ext>
-            </a:extLst>
-          </p:cNvPr>
-          <p:cNvSpPr txBox="1"/>
-          <p:nvPr/>
-        </p:nvSpPr>
-        <p:spPr>
-          <a:xfrm>
-            <a:off x="8634581" y="2441053"/>
-            <a:ext cx="3550335" cy="1754326"/>
-          </a:xfrm>
-          <a:prstGeom prst="rect">
-            <a:avLst/>
-          </a:prstGeom>
-          <a:noFill/>
-        </p:spPr>
-        <p:txBody>
-          <a:bodyPr wrap="square">
-            <a:spAutoFit/>
-          </a:bodyPr>
-          <a:lstStyle/>
-          <a:p>
-            <a:r>
-              <a:rPr lang="pt-BR" b="1" dirty="0">
-                <a:latin typeface="Nunito Sans Normal" pitchFamily="2" charset="0"/>
-              </a:rPr>
-              <a:t>The locations with a stronger convertion rates are, respectively:</a:t>
-            </a:r>
-            <a:endParaRPr lang="pt-BR" dirty="0">
-              <a:latin typeface="Nunito Sans Normal" pitchFamily="2" charset="0"/>
-            </a:endParaRPr>
-          </a:p>
-          <a:p>
-            <a:pPr marL="285750" indent="-285750">
-              <a:buFont typeface="Arial" panose="020B0604020202020204" pitchFamily="34" charset="0"/>
-              <a:buChar char="•"/>
-            </a:pPr>
-            <a:r>
-              <a:rPr lang="pt-BR" dirty="0">
-                <a:latin typeface="Nunito Sans Normal" pitchFamily="2" charset="0"/>
-              </a:rPr>
-              <a:t>Non-continental us = 31.82%</a:t>
-            </a:r>
-          </a:p>
-          <a:p>
-            <a:pPr marL="285750" indent="-285750">
-              <a:buFont typeface="Arial" panose="020B0604020202020204" pitchFamily="34" charset="0"/>
-              <a:buChar char="•"/>
-            </a:pPr>
-            <a:r>
-              <a:rPr lang="pt-BR" dirty="0">
-                <a:latin typeface="Nunito Sans Normal" pitchFamily="2" charset="0"/>
-              </a:rPr>
-              <a:t>Canada = 27.99%</a:t>
-            </a:r>
-          </a:p>
-          <a:p>
-            <a:pPr marL="285750" indent="-285750">
-              <a:buFont typeface="Arial" panose="020B0604020202020204" pitchFamily="34" charset="0"/>
-              <a:buChar char="•"/>
-            </a:pPr>
-            <a:r>
-              <a:rPr lang="pt-BR" dirty="0">
-                <a:latin typeface="Nunito Sans Normal" pitchFamily="2" charset="0"/>
-              </a:rPr>
-              <a:t>Us-midwest = 24.33%</a:t>
-            </a:r>
-          </a:p>
-        </p:txBody>
-      </p:sp>
-      <p:sp>
-        <p:nvSpPr>
           <p:cNvPr id="9" name="TextBox 8">
             <a:extLst>
               <a:ext uri="{FF2B5EF4-FFF2-40B4-BE49-F238E27FC236}">
@@ -19388,7 +20107,7 @@
 </p:sld>
 </file>
 
-<file path=ppt/slides/slide33.xml><?xml version="1.0" encoding="utf-8"?>
+<file path=ppt/slides/slide36.xml><?xml version="1.0" encoding="utf-8"?>
 <p:sld xmlns:a="http://schemas.openxmlformats.org/drawingml/2006/main" xmlns:r="http://schemas.openxmlformats.org/officeDocument/2006/relationships" xmlns:p="http://schemas.openxmlformats.org/presentationml/2006/main">
   <p:cSld>
     <p:spTree>
@@ -19560,7 +20279,7 @@
 </p:sld>
 </file>
 
-<file path=ppt/slides/slide34.xml><?xml version="1.0" encoding="utf-8"?>
+<file path=ppt/slides/slide37.xml><?xml version="1.0" encoding="utf-8"?>
 <p:sld xmlns:a="http://schemas.openxmlformats.org/drawingml/2006/main" xmlns:r="http://schemas.openxmlformats.org/officeDocument/2006/relationships" xmlns:p="http://schemas.openxmlformats.org/presentationml/2006/main">
   <p:cSld>
     <p:spTree>
@@ -20069,7 +20788,7 @@
 </p:sld>
 </file>
 
-<file path=ppt/slides/slide35.xml><?xml version="1.0" encoding="utf-8"?>
+<file path=ppt/slides/slide38.xml><?xml version="1.0" encoding="utf-8"?>
 <p:sld xmlns:a="http://schemas.openxmlformats.org/drawingml/2006/main" xmlns:r="http://schemas.openxmlformats.org/officeDocument/2006/relationships" xmlns:p="http://schemas.openxmlformats.org/presentationml/2006/main">
   <p:cSld>
     <p:spTree>

</xml_diff>